<commit_message>
clarification on lesson 01
</commit_message>
<xml_diff>
--- a/doc/intro/slides/lesson_01_intro.pptx
+++ b/doc/intro/slides/lesson_01_intro.pptx
@@ -5,7 +5,7 @@
     <p:sldMasterId id="2147483648" r:id="rId1"/>
   </p:sldMasterIdLst>
   <p:notesMasterIdLst>
-    <p:notesMasterId r:id="rId48"/>
+    <p:notesMasterId r:id="rId49"/>
   </p:notesMasterIdLst>
   <p:sldIdLst>
     <p:sldId id="256" r:id="rId2"/>
@@ -45,15 +45,16 @@
     <p:sldId id="296" r:id="rId36"/>
     <p:sldId id="297" r:id="rId37"/>
     <p:sldId id="298" r:id="rId38"/>
-    <p:sldId id="301" r:id="rId39"/>
-    <p:sldId id="293" r:id="rId40"/>
-    <p:sldId id="299" r:id="rId41"/>
-    <p:sldId id="295" r:id="rId42"/>
-    <p:sldId id="270" r:id="rId43"/>
-    <p:sldId id="300" r:id="rId44"/>
-    <p:sldId id="302" r:id="rId45"/>
-    <p:sldId id="303" r:id="rId46"/>
-    <p:sldId id="271" r:id="rId47"/>
+    <p:sldId id="304" r:id="rId39"/>
+    <p:sldId id="301" r:id="rId40"/>
+    <p:sldId id="293" r:id="rId41"/>
+    <p:sldId id="299" r:id="rId42"/>
+    <p:sldId id="295" r:id="rId43"/>
+    <p:sldId id="270" r:id="rId44"/>
+    <p:sldId id="300" r:id="rId45"/>
+    <p:sldId id="302" r:id="rId46"/>
+    <p:sldId id="303" r:id="rId47"/>
+    <p:sldId id="271" r:id="rId48"/>
   </p:sldIdLst>
   <p:sldSz cx="12192000" cy="6858000"/>
   <p:notesSz cx="6858000" cy="9144000"/>
@@ -242,7 +243,7 @@
           <a:p>
             <a:fld id="{9B5B52BA-3295-0343-9E28-A260A811DD10}" type="datetimeFigureOut">
               <a:rPr lang="en-US" smtClean="0"/>
-              <a:t>12/21/17</a:t>
+              <a:t>12/28/17</a:t>
             </a:fld>
             <a:endParaRPr lang="en-US"/>
           </a:p>
@@ -641,7 +642,7 @@
           <a:p>
             <a:fld id="{04F1D4A2-813C-F741-B481-C92B3A596030}" type="datetimeFigureOut">
               <a:rPr lang="en-US" smtClean="0"/>
-              <a:t>12/21/17</a:t>
+              <a:t>12/28/17</a:t>
             </a:fld>
             <a:endParaRPr lang="en-US"/>
           </a:p>
@@ -811,7 +812,7 @@
           <a:p>
             <a:fld id="{04F1D4A2-813C-F741-B481-C92B3A596030}" type="datetimeFigureOut">
               <a:rPr lang="en-US" smtClean="0"/>
-              <a:t>12/21/17</a:t>
+              <a:t>12/28/17</a:t>
             </a:fld>
             <a:endParaRPr lang="en-US"/>
           </a:p>
@@ -991,7 +992,7 @@
           <a:p>
             <a:fld id="{04F1D4A2-813C-F741-B481-C92B3A596030}" type="datetimeFigureOut">
               <a:rPr lang="en-US" smtClean="0"/>
-              <a:t>12/21/17</a:t>
+              <a:t>12/28/17</a:t>
             </a:fld>
             <a:endParaRPr lang="en-US"/>
           </a:p>
@@ -1324,7 +1325,7 @@
           <a:p>
             <a:fld id="{04F1D4A2-813C-F741-B481-C92B3A596030}" type="datetimeFigureOut">
               <a:rPr lang="en-US" smtClean="0"/>
-              <a:t>12/21/17</a:t>
+              <a:t>12/28/17</a:t>
             </a:fld>
             <a:endParaRPr lang="en-US"/>
           </a:p>
@@ -1570,7 +1571,7 @@
           <a:p>
             <a:fld id="{04F1D4A2-813C-F741-B481-C92B3A596030}" type="datetimeFigureOut">
               <a:rPr lang="en-US" smtClean="0"/>
-              <a:t>12/21/17</a:t>
+              <a:t>12/28/17</a:t>
             </a:fld>
             <a:endParaRPr lang="en-US"/>
           </a:p>
@@ -1802,7 +1803,7 @@
           <a:p>
             <a:fld id="{04F1D4A2-813C-F741-B481-C92B3A596030}" type="datetimeFigureOut">
               <a:rPr lang="en-US" smtClean="0"/>
-              <a:t>12/21/17</a:t>
+              <a:t>12/28/17</a:t>
             </a:fld>
             <a:endParaRPr lang="en-US"/>
           </a:p>
@@ -2169,7 +2170,7 @@
           <a:p>
             <a:fld id="{04F1D4A2-813C-F741-B481-C92B3A596030}" type="datetimeFigureOut">
               <a:rPr lang="en-US" smtClean="0"/>
-              <a:t>12/21/17</a:t>
+              <a:t>12/28/17</a:t>
             </a:fld>
             <a:endParaRPr lang="en-US"/>
           </a:p>
@@ -2287,7 +2288,7 @@
           <a:p>
             <a:fld id="{04F1D4A2-813C-F741-B481-C92B3A596030}" type="datetimeFigureOut">
               <a:rPr lang="en-US" smtClean="0"/>
-              <a:t>12/21/17</a:t>
+              <a:t>12/28/17</a:t>
             </a:fld>
             <a:endParaRPr lang="en-US"/>
           </a:p>
@@ -2382,7 +2383,7 @@
           <a:p>
             <a:fld id="{04F1D4A2-813C-F741-B481-C92B3A596030}" type="datetimeFigureOut">
               <a:rPr lang="en-US" smtClean="0"/>
-              <a:t>12/21/17</a:t>
+              <a:t>12/28/17</a:t>
             </a:fld>
             <a:endParaRPr lang="en-US"/>
           </a:p>
@@ -2659,7 +2660,7 @@
           <a:p>
             <a:fld id="{04F1D4A2-813C-F741-B481-C92B3A596030}" type="datetimeFigureOut">
               <a:rPr lang="en-US" smtClean="0"/>
-              <a:t>12/21/17</a:t>
+              <a:t>12/28/17</a:t>
             </a:fld>
             <a:endParaRPr lang="en-US"/>
           </a:p>
@@ -2912,7 +2913,7 @@
           <a:p>
             <a:fld id="{04F1D4A2-813C-F741-B481-C92B3A596030}" type="datetimeFigureOut">
               <a:rPr lang="en-US" smtClean="0"/>
-              <a:t>12/21/17</a:t>
+              <a:t>12/28/17</a:t>
             </a:fld>
             <a:endParaRPr lang="en-US"/>
           </a:p>
@@ -3125,7 +3126,7 @@
           <a:p>
             <a:fld id="{04F1D4A2-813C-F741-B481-C92B3A596030}" type="datetimeFigureOut">
               <a:rPr lang="en-US" smtClean="0"/>
-              <a:t>12/21/17</a:t>
+              <a:t>12/28/17</a:t>
             </a:fld>
             <a:endParaRPr lang="en-US"/>
           </a:p>
@@ -9465,7 +9466,7 @@
           <a:p>
             <a:r>
               <a:rPr lang="en-US" dirty="0" smtClean="0"/>
-              <a:t>Properties ${}</a:t>
+              <a:t>Transitive Dependencies</a:t>
             </a:r>
             <a:endParaRPr lang="en-US" dirty="0"/>
           </a:p>
@@ -9473,658 +9474,115 @@
       </p:sp>
       <p:sp>
         <p:nvSpPr>
-          <p:cNvPr id="5" name="TextBox 4"/>
-          <p:cNvSpPr txBox="1"/>
-          <p:nvPr/>
+          <p:cNvPr id="3" name="Content Placeholder 2"/>
+          <p:cNvSpPr>
+            <a:spLocks noGrp="1"/>
+          </p:cNvSpPr>
+          <p:nvPr>
+            <p:ph idx="1"/>
+          </p:nvPr>
         </p:nvSpPr>
         <p:spPr>
           <a:xfrm>
-            <a:off x="405516" y="1757239"/>
-            <a:ext cx="6221447" cy="3539430"/>
+            <a:off x="282387" y="2129958"/>
+            <a:ext cx="5881871" cy="4664822"/>
+          </a:xfrm>
+        </p:spPr>
+        <p:txBody>
+          <a:bodyPr>
+            <a:normAutofit fontScale="85000" lnSpcReduction="20000"/>
+          </a:bodyPr>
+          <a:lstStyle/>
+          <a:p>
+            <a:r>
+              <a:rPr lang="en-US" dirty="0" smtClean="0"/>
+              <a:t>A dependency JAR can have its own dependencies. </a:t>
+            </a:r>
+          </a:p>
+          <a:p>
+            <a:r>
+              <a:rPr lang="en-US" dirty="0" smtClean="0"/>
+              <a:t>And these  transitive dependencies can have their own dependencies, and so on</a:t>
+            </a:r>
+            <a:r>
+              <a:rPr lang="mr-IN" dirty="0" smtClean="0"/>
+              <a:t>…</a:t>
+            </a:r>
+            <a:endParaRPr lang="en-US" dirty="0" smtClean="0"/>
+          </a:p>
+          <a:p>
+            <a:r>
+              <a:rPr lang="en-US" dirty="0" smtClean="0"/>
+              <a:t>Can use IntelliJ “Maven Projects” view to see exactly what is used in a module</a:t>
+            </a:r>
+          </a:p>
+          <a:p>
+            <a:r>
+              <a:rPr lang="en-US" dirty="0" smtClean="0"/>
+              <a:t>For example: </a:t>
+            </a:r>
+            <a:r>
+              <a:rPr lang="en-US" i="1" dirty="0" smtClean="0"/>
+              <a:t>hibernate-core</a:t>
+            </a:r>
+            <a:r>
+              <a:rPr lang="en-US" dirty="0" smtClean="0"/>
+              <a:t> pulls in </a:t>
+            </a:r>
+            <a:r>
+              <a:rPr lang="en-US" i="1" dirty="0" smtClean="0"/>
+              <a:t>hibernate-commons-annotations</a:t>
+            </a:r>
+            <a:r>
+              <a:rPr lang="en-US" dirty="0" smtClean="0"/>
+              <a:t>, which pulls in </a:t>
+            </a:r>
+            <a:r>
+              <a:rPr lang="en-US" i="1" dirty="0" err="1" smtClean="0"/>
+              <a:t>jboss</a:t>
+            </a:r>
+            <a:r>
+              <a:rPr lang="en-US" i="1" dirty="0" smtClean="0"/>
+              <a:t>-logging</a:t>
+            </a:r>
+            <a:endParaRPr lang="en-US" dirty="0"/>
+          </a:p>
+        </p:txBody>
+      </p:sp>
+      <p:pic>
+        <p:nvPicPr>
+          <p:cNvPr id="4" name="Picture 3"/>
+          <p:cNvPicPr>
+            <a:picLocks noChangeAspect="1"/>
+          </p:cNvPicPr>
+          <p:nvPr/>
+        </p:nvPicPr>
+        <p:blipFill>
+          <a:blip r:embed="rId2" cstate="screen">
+            <a:extLst>
+              <a:ext uri="{28A0092B-C50C-407E-A947-70E740481C1C}">
+                <a14:useLocalDpi xmlns:a14="http://schemas.microsoft.com/office/drawing/2010/main"/>
+              </a:ext>
+            </a:extLst>
+          </a:blip>
+          <a:stretch>
+            <a:fillRect/>
+          </a:stretch>
+        </p:blipFill>
+        <p:spPr>
+          <a:xfrm>
+            <a:off x="6277611" y="2393575"/>
+            <a:ext cx="5914389" cy="3845859"/>
           </a:xfrm>
           <a:prstGeom prst="rect">
             <a:avLst/>
           </a:prstGeom>
-          <a:noFill/>
         </p:spPr>
-        <p:txBody>
-          <a:bodyPr wrap="none" rtlCol="0">
-            <a:spAutoFit/>
-          </a:bodyPr>
-          <a:lstStyle/>
-          <a:p>
-            <a:r>
-              <a:rPr lang="en-US" sz="1400" dirty="0"/>
-              <a:t>&lt;</a:t>
-            </a:r>
-            <a:r>
-              <a:rPr lang="en-US" sz="1400" b="1" dirty="0"/>
-              <a:t>properties</a:t>
-            </a:r>
-            <a:r>
-              <a:rPr lang="en-US" sz="1400" dirty="0"/>
-              <a:t>&gt;</a:t>
-            </a:r>
-            <a:br>
-              <a:rPr lang="en-US" sz="1400" dirty="0"/>
-            </a:br>
-            <a:r>
-              <a:rPr lang="en-US" sz="1400" dirty="0"/>
-              <a:t>    &lt;</a:t>
-            </a:r>
-            <a:r>
-              <a:rPr lang="en-US" sz="1400" b="1" dirty="0" err="1"/>
-              <a:t>project.build.sourceEncoding</a:t>
-            </a:r>
-            <a:r>
-              <a:rPr lang="en-US" sz="1400" dirty="0"/>
-              <a:t>&gt;UTF-8&lt;/</a:t>
-            </a:r>
-            <a:r>
-              <a:rPr lang="en-US" sz="1400" b="1" dirty="0" err="1"/>
-              <a:t>project.build.sourceEncoding</a:t>
-            </a:r>
-            <a:r>
-              <a:rPr lang="en-US" sz="1400" dirty="0"/>
-              <a:t>&gt;</a:t>
-            </a:r>
-            <a:br>
-              <a:rPr lang="en-US" sz="1400" dirty="0"/>
-            </a:br>
-            <a:r>
-              <a:rPr lang="en-US" sz="1400" dirty="0"/>
-              <a:t>    &lt;</a:t>
-            </a:r>
-            <a:r>
-              <a:rPr lang="en-US" sz="1400" b="1" dirty="0" err="1"/>
-              <a:t>project.build.sourceEncoding</a:t>
-            </a:r>
-            <a:r>
-              <a:rPr lang="en-US" sz="1400" dirty="0"/>
-              <a:t>&gt;UTF-8&lt;/</a:t>
-            </a:r>
-            <a:r>
-              <a:rPr lang="en-US" sz="1400" b="1" dirty="0" err="1"/>
-              <a:t>project.build.sourceEncoding</a:t>
-            </a:r>
-            <a:r>
-              <a:rPr lang="en-US" sz="1400" dirty="0"/>
-              <a:t>&gt;</a:t>
-            </a:r>
-            <a:br>
-              <a:rPr lang="en-US" sz="1400" dirty="0"/>
-            </a:br>
-            <a:r>
-              <a:rPr lang="en-US" sz="1400" dirty="0"/>
-              <a:t>    &lt;</a:t>
-            </a:r>
-            <a:r>
-              <a:rPr lang="en-US" sz="1400" b="1" dirty="0" err="1"/>
-              <a:t>project.reporting.outputEncoding</a:t>
-            </a:r>
-            <a:r>
-              <a:rPr lang="en-US" sz="1400" dirty="0"/>
-              <a:t>&gt;UTF-8&lt;/</a:t>
-            </a:r>
-            <a:r>
-              <a:rPr lang="en-US" sz="1400" b="1" dirty="0" err="1"/>
-              <a:t>project.reporting.outputEncoding</a:t>
-            </a:r>
-            <a:r>
-              <a:rPr lang="en-US" sz="1400" dirty="0"/>
-              <a:t>&gt;</a:t>
-            </a:r>
-            <a:br>
-              <a:rPr lang="en-US" sz="1400" dirty="0"/>
-            </a:br>
-            <a:r>
-              <a:rPr lang="en-US" sz="1400" dirty="0"/>
-              <a:t>    &lt;</a:t>
-            </a:r>
-            <a:r>
-              <a:rPr lang="en-US" sz="1400" b="1" dirty="0"/>
-              <a:t>fs</a:t>
-            </a:r>
-            <a:r>
-              <a:rPr lang="en-US" sz="1400" dirty="0"/>
-              <a:t>&gt;${</a:t>
-            </a:r>
-            <a:r>
-              <a:rPr lang="en-US" sz="1400" dirty="0" err="1"/>
-              <a:t>file.separator</a:t>
-            </a:r>
-            <a:r>
-              <a:rPr lang="en-US" sz="1400" dirty="0"/>
-              <a:t>}&lt;/</a:t>
-            </a:r>
-            <a:r>
-              <a:rPr lang="en-US" sz="1400" b="1" dirty="0"/>
-              <a:t>fs</a:t>
-            </a:r>
-            <a:r>
-              <a:rPr lang="en-US" sz="1400" dirty="0"/>
-              <a:t>&gt;</a:t>
-            </a:r>
-            <a:br>
-              <a:rPr lang="en-US" sz="1400" dirty="0"/>
-            </a:br>
-            <a:r>
-              <a:rPr lang="en-US" sz="1400" dirty="0"/>
-              <a:t>    &lt;</a:t>
-            </a:r>
-            <a:r>
-              <a:rPr lang="en-US" sz="1400" b="1" dirty="0" err="1"/>
-              <a:t>version.java</a:t>
-            </a:r>
-            <a:r>
-              <a:rPr lang="en-US" sz="1400" dirty="0"/>
-              <a:t>&gt;1.8&lt;/</a:t>
-            </a:r>
-            <a:r>
-              <a:rPr lang="en-US" sz="1400" b="1" dirty="0" err="1"/>
-              <a:t>version.java</a:t>
-            </a:r>
-            <a:r>
-              <a:rPr lang="en-US" sz="1400" dirty="0"/>
-              <a:t>&gt;</a:t>
-            </a:r>
-            <a:br>
-              <a:rPr lang="en-US" sz="1400" dirty="0"/>
-            </a:br>
-            <a:r>
-              <a:rPr lang="en-US" sz="1400" dirty="0"/>
-              <a:t>    &lt;</a:t>
-            </a:r>
-            <a:r>
-              <a:rPr lang="en-US" sz="1400" b="1" dirty="0" err="1"/>
-              <a:t>version.jacoco</a:t>
-            </a:r>
-            <a:r>
-              <a:rPr lang="en-US" sz="1400" dirty="0"/>
-              <a:t>&gt;0.7.9&lt;/</a:t>
-            </a:r>
-            <a:r>
-              <a:rPr lang="en-US" sz="1400" b="1" dirty="0" err="1"/>
-              <a:t>version.jacoco</a:t>
-            </a:r>
-            <a:r>
-              <a:rPr lang="en-US" sz="1400" dirty="0"/>
-              <a:t>&gt;</a:t>
-            </a:r>
-            <a:br>
-              <a:rPr lang="en-US" sz="1400" dirty="0"/>
-            </a:br>
-            <a:r>
-              <a:rPr lang="en-US" sz="1400" dirty="0"/>
-              <a:t>    &lt;</a:t>
-            </a:r>
-            <a:r>
-              <a:rPr lang="en-US" sz="1400" b="1" dirty="0" err="1"/>
-              <a:t>version.javax.el</a:t>
-            </a:r>
-            <a:r>
-              <a:rPr lang="en-US" sz="1400" dirty="0"/>
-              <a:t>&gt;2.2.4&lt;/</a:t>
-            </a:r>
-            <a:r>
-              <a:rPr lang="en-US" sz="1400" b="1" dirty="0" err="1"/>
-              <a:t>version.javax.el</a:t>
-            </a:r>
-            <a:r>
-              <a:rPr lang="en-US" sz="1400" dirty="0"/>
-              <a:t>&gt;</a:t>
-            </a:r>
-            <a:br>
-              <a:rPr lang="en-US" sz="1400" dirty="0"/>
-            </a:br>
-            <a:r>
-              <a:rPr lang="en-US" sz="1400" dirty="0"/>
-              <a:t>    &lt;</a:t>
-            </a:r>
-            <a:r>
-              <a:rPr lang="en-US" sz="1400" b="1" dirty="0" err="1"/>
-              <a:t>version.hibernate.jpa</a:t>
-            </a:r>
-            <a:r>
-              <a:rPr lang="en-US" sz="1400" dirty="0"/>
-              <a:t>&gt;1.0.0.Final&lt;/</a:t>
-            </a:r>
-            <a:r>
-              <a:rPr lang="en-US" sz="1400" b="1" dirty="0" err="1"/>
-              <a:t>version.hibernate.jpa</a:t>
-            </a:r>
-            <a:r>
-              <a:rPr lang="en-US" sz="1400" dirty="0"/>
-              <a:t>&gt;</a:t>
-            </a:r>
-            <a:br>
-              <a:rPr lang="en-US" sz="1400" dirty="0"/>
-            </a:br>
-            <a:r>
-              <a:rPr lang="en-US" sz="1400" dirty="0"/>
-              <a:t>    &lt;</a:t>
-            </a:r>
-            <a:r>
-              <a:rPr lang="en-US" sz="1400" b="1" dirty="0" err="1"/>
-              <a:t>version.hibernate.core</a:t>
-            </a:r>
-            <a:r>
-              <a:rPr lang="en-US" sz="1400" dirty="0"/>
-              <a:t>&gt;5.2.9.Final&lt;/</a:t>
-            </a:r>
-            <a:r>
-              <a:rPr lang="en-US" sz="1400" b="1" dirty="0" err="1"/>
-              <a:t>version.hibernate.core</a:t>
-            </a:r>
-            <a:r>
-              <a:rPr lang="en-US" sz="1400" dirty="0"/>
-              <a:t>&gt;</a:t>
-            </a:r>
-            <a:br>
-              <a:rPr lang="en-US" sz="1400" dirty="0"/>
-            </a:br>
-            <a:r>
-              <a:rPr lang="en-US" sz="1400" dirty="0"/>
-              <a:t>    &lt;</a:t>
-            </a:r>
-            <a:r>
-              <a:rPr lang="en-US" sz="1400" b="1" dirty="0" err="1"/>
-              <a:t>version.hibernate.validator</a:t>
-            </a:r>
-            <a:r>
-              <a:rPr lang="en-US" sz="1400" dirty="0"/>
-              <a:t>&gt;5.3.4.Final&lt;/</a:t>
-            </a:r>
-            <a:r>
-              <a:rPr lang="en-US" sz="1400" b="1" dirty="0" err="1"/>
-              <a:t>version.hibernate.validator</a:t>
-            </a:r>
-            <a:r>
-              <a:rPr lang="en-US" sz="1400" dirty="0"/>
-              <a:t>&gt;</a:t>
-            </a:r>
-            <a:br>
-              <a:rPr lang="en-US" sz="1400" dirty="0"/>
-            </a:br>
-            <a:r>
-              <a:rPr lang="en-US" sz="1400" dirty="0"/>
-              <a:t>    &lt;</a:t>
-            </a:r>
-            <a:r>
-              <a:rPr lang="en-US" sz="1400" b="1" dirty="0"/>
-              <a:t>version.h2</a:t>
-            </a:r>
-            <a:r>
-              <a:rPr lang="en-US" sz="1400" dirty="0"/>
-              <a:t>&gt;1.4.194&lt;/</a:t>
-            </a:r>
-            <a:r>
-              <a:rPr lang="en-US" sz="1400" b="1" dirty="0"/>
-              <a:t>version.h2</a:t>
-            </a:r>
-            <a:r>
-              <a:rPr lang="en-US" sz="1400" dirty="0"/>
-              <a:t>&gt;</a:t>
-            </a:r>
-            <a:br>
-              <a:rPr lang="en-US" sz="1400" dirty="0"/>
-            </a:br>
-            <a:r>
-              <a:rPr lang="en-US" sz="1400" dirty="0"/>
-              <a:t>    &lt;</a:t>
-            </a:r>
-            <a:r>
-              <a:rPr lang="en-US" sz="1400" b="1" dirty="0" err="1"/>
-              <a:t>version.postgres</a:t>
-            </a:r>
-            <a:r>
-              <a:rPr lang="en-US" sz="1400" dirty="0"/>
-              <a:t>&gt;42.1.4&lt;/</a:t>
-            </a:r>
-            <a:r>
-              <a:rPr lang="en-US" sz="1400" b="1" dirty="0" err="1"/>
-              <a:t>version.postgres</a:t>
-            </a:r>
-            <a:r>
-              <a:rPr lang="en-US" sz="1400" dirty="0"/>
-              <a:t>&gt;</a:t>
-            </a:r>
-            <a:br>
-              <a:rPr lang="en-US" sz="1400" dirty="0"/>
-            </a:br>
-            <a:r>
-              <a:rPr lang="en-US" sz="1400" dirty="0"/>
-              <a:t>    &lt;</a:t>
-            </a:r>
-            <a:r>
-              <a:rPr lang="en-US" sz="1400" b="1" dirty="0" err="1"/>
-              <a:t>version.resteasy</a:t>
-            </a:r>
-            <a:r>
-              <a:rPr lang="en-US" sz="1400" dirty="0"/>
-              <a:t>&gt;3.1.3.Final&lt;/</a:t>
-            </a:r>
-            <a:r>
-              <a:rPr lang="en-US" sz="1400" b="1" dirty="0" err="1"/>
-              <a:t>version.resteasy</a:t>
-            </a:r>
-            <a:r>
-              <a:rPr lang="en-US" sz="1400" dirty="0"/>
-              <a:t>&gt;</a:t>
-            </a:r>
-            <a:br>
-              <a:rPr lang="en-US" sz="1400" dirty="0"/>
-            </a:br>
-            <a:r>
-              <a:rPr lang="en-US" sz="1400" dirty="0"/>
-              <a:t>    &lt;</a:t>
-            </a:r>
-            <a:r>
-              <a:rPr lang="en-US" sz="1400" b="1" dirty="0" err="1"/>
-              <a:t>version.testcontainers</a:t>
-            </a:r>
-            <a:r>
-              <a:rPr lang="en-US" sz="1400" dirty="0"/>
-              <a:t>&gt;1.4.3&lt;/</a:t>
-            </a:r>
-            <a:r>
-              <a:rPr lang="en-US" sz="1400" b="1" dirty="0" err="1"/>
-              <a:t>version.testcontainers</a:t>
-            </a:r>
-            <a:r>
-              <a:rPr lang="en-US" sz="1400" dirty="0"/>
-              <a:t>&gt;</a:t>
-            </a:r>
-            <a:br>
-              <a:rPr lang="en-US" sz="1400" dirty="0"/>
-            </a:br>
-            <a:r>
-              <a:rPr lang="en-US" sz="1400" dirty="0"/>
-              <a:t>&lt;/</a:t>
-            </a:r>
-            <a:r>
-              <a:rPr lang="en-US" sz="1400" b="1" dirty="0"/>
-              <a:t>properties</a:t>
-            </a:r>
-            <a:r>
-              <a:rPr lang="en-US" sz="1400" dirty="0"/>
-              <a:t>&gt;</a:t>
-            </a:r>
-          </a:p>
-        </p:txBody>
-      </p:sp>
-      <p:sp>
-        <p:nvSpPr>
-          <p:cNvPr id="6" name="TextBox 5"/>
-          <p:cNvSpPr txBox="1"/>
-          <p:nvPr/>
-        </p:nvSpPr>
-        <p:spPr>
-          <a:xfrm>
-            <a:off x="7545788" y="1948069"/>
-            <a:ext cx="4036554" cy="2862322"/>
-          </a:xfrm>
-          <a:prstGeom prst="rect">
-            <a:avLst/>
-          </a:prstGeom>
-          <a:noFill/>
-        </p:spPr>
-        <p:txBody>
-          <a:bodyPr wrap="none" rtlCol="0">
-            <a:spAutoFit/>
-          </a:bodyPr>
-          <a:lstStyle/>
-          <a:p>
-            <a:r>
-              <a:rPr lang="en-US" dirty="0"/>
-              <a:t>&lt;</a:t>
-            </a:r>
-            <a:r>
-              <a:rPr lang="en-US" b="1" dirty="0"/>
-              <a:t>dependency</a:t>
-            </a:r>
-            <a:r>
-              <a:rPr lang="en-US" dirty="0"/>
-              <a:t>&gt;</a:t>
-            </a:r>
-            <a:br>
-              <a:rPr lang="en-US" dirty="0"/>
-            </a:br>
-            <a:r>
-              <a:rPr lang="en-US" dirty="0"/>
-              <a:t>    &lt;</a:t>
-            </a:r>
-            <a:r>
-              <a:rPr lang="en-US" b="1" dirty="0" err="1"/>
-              <a:t>groupId</a:t>
-            </a:r>
-            <a:r>
-              <a:rPr lang="en-US" dirty="0"/>
-              <a:t>&gt;</a:t>
-            </a:r>
-            <a:r>
-              <a:rPr lang="en-US" dirty="0" err="1"/>
-              <a:t>javax.el</a:t>
-            </a:r>
-            <a:r>
-              <a:rPr lang="en-US" dirty="0"/>
-              <a:t>&lt;/</a:t>
-            </a:r>
-            <a:r>
-              <a:rPr lang="en-US" b="1" dirty="0" err="1"/>
-              <a:t>groupId</a:t>
-            </a:r>
-            <a:r>
-              <a:rPr lang="en-US" dirty="0"/>
-              <a:t>&gt;</a:t>
-            </a:r>
-            <a:br>
-              <a:rPr lang="en-US" dirty="0"/>
-            </a:br>
-            <a:r>
-              <a:rPr lang="en-US" dirty="0"/>
-              <a:t>    &lt;</a:t>
-            </a:r>
-            <a:r>
-              <a:rPr lang="en-US" b="1" dirty="0" err="1"/>
-              <a:t>artifactId</a:t>
-            </a:r>
-            <a:r>
-              <a:rPr lang="en-US" dirty="0"/>
-              <a:t>&gt;</a:t>
-            </a:r>
-            <a:r>
-              <a:rPr lang="en-US" dirty="0" err="1"/>
-              <a:t>javax.el-api</a:t>
-            </a:r>
-            <a:r>
-              <a:rPr lang="en-US" dirty="0"/>
-              <a:t>&lt;/</a:t>
-            </a:r>
-            <a:r>
-              <a:rPr lang="en-US" b="1" dirty="0" err="1"/>
-              <a:t>artifactId</a:t>
-            </a:r>
-            <a:r>
-              <a:rPr lang="en-US" dirty="0"/>
-              <a:t>&gt;</a:t>
-            </a:r>
-            <a:br>
-              <a:rPr lang="en-US" dirty="0"/>
-            </a:br>
-            <a:r>
-              <a:rPr lang="en-US" dirty="0"/>
-              <a:t>    &lt;</a:t>
-            </a:r>
-            <a:r>
-              <a:rPr lang="en-US" b="1" dirty="0"/>
-              <a:t>version</a:t>
-            </a:r>
-            <a:r>
-              <a:rPr lang="en-US" dirty="0"/>
-              <a:t>&gt;${</a:t>
-            </a:r>
-            <a:r>
-              <a:rPr lang="en-US" dirty="0" err="1"/>
-              <a:t>version.javax.el</a:t>
-            </a:r>
-            <a:r>
-              <a:rPr lang="en-US" dirty="0"/>
-              <a:t>}&lt;/</a:t>
-            </a:r>
-            <a:r>
-              <a:rPr lang="en-US" b="1" dirty="0"/>
-              <a:t>version</a:t>
-            </a:r>
-            <a:r>
-              <a:rPr lang="en-US" dirty="0"/>
-              <a:t>&gt;</a:t>
-            </a:r>
-            <a:br>
-              <a:rPr lang="en-US" dirty="0"/>
-            </a:br>
-            <a:r>
-              <a:rPr lang="en-US" dirty="0"/>
-              <a:t>&lt;/</a:t>
-            </a:r>
-            <a:r>
-              <a:rPr lang="en-US" b="1" dirty="0"/>
-              <a:t>dependency</a:t>
-            </a:r>
-            <a:r>
-              <a:rPr lang="en-US" dirty="0"/>
-              <a:t>&gt;</a:t>
-            </a:r>
-            <a:br>
-              <a:rPr lang="en-US" dirty="0"/>
-            </a:br>
-            <a:r>
-              <a:rPr lang="en-US" dirty="0"/>
-              <a:t>&lt;</a:t>
-            </a:r>
-            <a:r>
-              <a:rPr lang="en-US" b="1" dirty="0"/>
-              <a:t>dependency</a:t>
-            </a:r>
-            <a:r>
-              <a:rPr lang="en-US" dirty="0"/>
-              <a:t>&gt;</a:t>
-            </a:r>
-            <a:br>
-              <a:rPr lang="en-US" dirty="0"/>
-            </a:br>
-            <a:r>
-              <a:rPr lang="en-US" dirty="0"/>
-              <a:t>    &lt;</a:t>
-            </a:r>
-            <a:r>
-              <a:rPr lang="en-US" b="1" dirty="0" err="1"/>
-              <a:t>groupId</a:t>
-            </a:r>
-            <a:r>
-              <a:rPr lang="en-US" dirty="0"/>
-              <a:t>&gt;</a:t>
-            </a:r>
-            <a:r>
-              <a:rPr lang="en-US" dirty="0" err="1"/>
-              <a:t>org.glassfish.web</a:t>
-            </a:r>
-            <a:r>
-              <a:rPr lang="en-US" dirty="0"/>
-              <a:t>&lt;/</a:t>
-            </a:r>
-            <a:r>
-              <a:rPr lang="en-US" b="1" dirty="0" err="1"/>
-              <a:t>groupId</a:t>
-            </a:r>
-            <a:r>
-              <a:rPr lang="en-US" dirty="0"/>
-              <a:t>&gt;</a:t>
-            </a:r>
-            <a:br>
-              <a:rPr lang="en-US" dirty="0"/>
-            </a:br>
-            <a:r>
-              <a:rPr lang="en-US" dirty="0"/>
-              <a:t>    &lt;</a:t>
-            </a:r>
-            <a:r>
-              <a:rPr lang="en-US" b="1" dirty="0" err="1"/>
-              <a:t>artifactId</a:t>
-            </a:r>
-            <a:r>
-              <a:rPr lang="en-US" dirty="0"/>
-              <a:t>&gt;</a:t>
-            </a:r>
-            <a:r>
-              <a:rPr lang="en-US" dirty="0" err="1"/>
-              <a:t>javax.el</a:t>
-            </a:r>
-            <a:r>
-              <a:rPr lang="en-US" dirty="0"/>
-              <a:t>&lt;/</a:t>
-            </a:r>
-            <a:r>
-              <a:rPr lang="en-US" b="1" dirty="0" err="1"/>
-              <a:t>artifactId</a:t>
-            </a:r>
-            <a:r>
-              <a:rPr lang="en-US" dirty="0"/>
-              <a:t>&gt;</a:t>
-            </a:r>
-            <a:br>
-              <a:rPr lang="en-US" dirty="0"/>
-            </a:br>
-            <a:r>
-              <a:rPr lang="en-US" dirty="0"/>
-              <a:t>    &lt;</a:t>
-            </a:r>
-            <a:r>
-              <a:rPr lang="en-US" b="1" dirty="0"/>
-              <a:t>version</a:t>
-            </a:r>
-            <a:r>
-              <a:rPr lang="en-US" dirty="0"/>
-              <a:t>&gt;${</a:t>
-            </a:r>
-            <a:r>
-              <a:rPr lang="en-US" dirty="0" err="1"/>
-              <a:t>version.javax.el</a:t>
-            </a:r>
-            <a:r>
-              <a:rPr lang="en-US" dirty="0"/>
-              <a:t>}&lt;/</a:t>
-            </a:r>
-            <a:r>
-              <a:rPr lang="en-US" b="1" dirty="0"/>
-              <a:t>version</a:t>
-            </a:r>
-            <a:r>
-              <a:rPr lang="en-US" dirty="0"/>
-              <a:t>&gt;</a:t>
-            </a:r>
-            <a:br>
-              <a:rPr lang="en-US" dirty="0"/>
-            </a:br>
-            <a:r>
-              <a:rPr lang="en-US" dirty="0"/>
-              <a:t>&lt;/</a:t>
-            </a:r>
-            <a:r>
-              <a:rPr lang="en-US" b="1" dirty="0"/>
-              <a:t>dependency</a:t>
-            </a:r>
-            <a:r>
-              <a:rPr lang="en-US" dirty="0"/>
-              <a:t>&gt;</a:t>
-            </a:r>
-          </a:p>
-        </p:txBody>
-      </p:sp>
+      </p:pic>
     </p:spTree>
     <p:extLst>
       <p:ext uri="{BB962C8B-B14F-4D97-AF65-F5344CB8AC3E}">
-        <p14:creationId xmlns:p14="http://schemas.microsoft.com/office/powerpoint/2010/main" val="999469944"/>
+        <p14:creationId xmlns:p14="http://schemas.microsoft.com/office/powerpoint/2010/main" val="915451318"/>
       </p:ext>
     </p:extLst>
   </p:cSld>
@@ -10168,7 +9626,7 @@
           <a:p>
             <a:r>
               <a:rPr lang="en-US" dirty="0" smtClean="0"/>
-              <a:t>Plugins</a:t>
+              <a:t>Properties ${}</a:t>
             </a:r>
             <a:endParaRPr lang="en-US" dirty="0"/>
           </a:p>
@@ -10176,67 +9634,14 @@
       </p:sp>
       <p:sp>
         <p:nvSpPr>
-          <p:cNvPr id="3" name="Content Placeholder 2"/>
-          <p:cNvSpPr>
-            <a:spLocks noGrp="1"/>
-          </p:cNvSpPr>
-          <p:nvPr>
-            <p:ph idx="1"/>
-          </p:nvPr>
+          <p:cNvPr id="5" name="TextBox 4"/>
+          <p:cNvSpPr txBox="1"/>
+          <p:nvPr/>
         </p:nvSpPr>
         <p:spPr>
           <a:xfrm>
-            <a:off x="361122" y="1777917"/>
-            <a:ext cx="6516756" cy="4885276"/>
-          </a:xfrm>
-        </p:spPr>
-        <p:txBody>
-          <a:bodyPr>
-            <a:normAutofit/>
-          </a:bodyPr>
-          <a:lstStyle/>
-          <a:p>
-            <a:r>
-              <a:rPr lang="en-US" dirty="0" smtClean="0"/>
-              <a:t>Used to extend the functionalities of Maven</a:t>
-            </a:r>
-          </a:p>
-          <a:p>
-            <a:r>
-              <a:rPr lang="en-US" dirty="0" smtClean="0"/>
-              <a:t>Plugins are downloaded and configured like any third-party library</a:t>
-            </a:r>
-          </a:p>
-          <a:p>
-            <a:r>
-              <a:rPr lang="en-US" dirty="0" smtClean="0"/>
-              <a:t>Many of the base functionalities of Maven are themselves represented as plugins</a:t>
-            </a:r>
-          </a:p>
-          <a:p>
-            <a:pPr lvl="1"/>
-            <a:r>
-              <a:rPr lang="en-US" dirty="0" err="1" smtClean="0"/>
-              <a:t>Eg</a:t>
-            </a:r>
-            <a:r>
-              <a:rPr lang="en-US" dirty="0" smtClean="0"/>
-              <a:t>, compile Java code</a:t>
-            </a:r>
-            <a:endParaRPr lang="en-US" dirty="0"/>
-          </a:p>
-        </p:txBody>
-      </p:sp>
-      <p:sp>
-        <p:nvSpPr>
-          <p:cNvPr id="4" name="TextBox 3"/>
-          <p:cNvSpPr txBox="1"/>
-          <p:nvPr/>
-        </p:nvSpPr>
-        <p:spPr>
-          <a:xfrm>
-            <a:off x="6875993" y="1777917"/>
-            <a:ext cx="5316007" cy="3693319"/>
+            <a:off x="405516" y="1757239"/>
+            <a:ext cx="6221447" cy="3539430"/>
           </a:xfrm>
           <a:prstGeom prst="rect">
             <a:avLst/>
@@ -10250,12 +9655,394 @@
           <a:lstStyle/>
           <a:p>
             <a:r>
+              <a:rPr lang="en-US" sz="1400" dirty="0"/>
+              <a:t>&lt;</a:t>
+            </a:r>
+            <a:r>
+              <a:rPr lang="en-US" sz="1400" b="1" dirty="0"/>
+              <a:t>properties</a:t>
+            </a:r>
+            <a:r>
+              <a:rPr lang="en-US" sz="1400" dirty="0"/>
+              <a:t>&gt;</a:t>
+            </a:r>
+            <a:br>
+              <a:rPr lang="en-US" sz="1400" dirty="0"/>
+            </a:br>
+            <a:r>
+              <a:rPr lang="en-US" sz="1400" dirty="0"/>
+              <a:t>    &lt;</a:t>
+            </a:r>
+            <a:r>
+              <a:rPr lang="en-US" sz="1400" b="1" dirty="0" err="1"/>
+              <a:t>project.build.sourceEncoding</a:t>
+            </a:r>
+            <a:r>
+              <a:rPr lang="en-US" sz="1400" dirty="0"/>
+              <a:t>&gt;UTF-8&lt;/</a:t>
+            </a:r>
+            <a:r>
+              <a:rPr lang="en-US" sz="1400" b="1" dirty="0" err="1"/>
+              <a:t>project.build.sourceEncoding</a:t>
+            </a:r>
+            <a:r>
+              <a:rPr lang="en-US" sz="1400" dirty="0"/>
+              <a:t>&gt;</a:t>
+            </a:r>
+            <a:br>
+              <a:rPr lang="en-US" sz="1400" dirty="0"/>
+            </a:br>
+            <a:r>
+              <a:rPr lang="en-US" sz="1400" dirty="0"/>
+              <a:t>    &lt;</a:t>
+            </a:r>
+            <a:r>
+              <a:rPr lang="en-US" sz="1400" b="1" dirty="0" err="1"/>
+              <a:t>project.build.sourceEncoding</a:t>
+            </a:r>
+            <a:r>
+              <a:rPr lang="en-US" sz="1400" dirty="0"/>
+              <a:t>&gt;UTF-8&lt;/</a:t>
+            </a:r>
+            <a:r>
+              <a:rPr lang="en-US" sz="1400" b="1" dirty="0" err="1"/>
+              <a:t>project.build.sourceEncoding</a:t>
+            </a:r>
+            <a:r>
+              <a:rPr lang="en-US" sz="1400" dirty="0"/>
+              <a:t>&gt;</a:t>
+            </a:r>
+            <a:br>
+              <a:rPr lang="en-US" sz="1400" dirty="0"/>
+            </a:br>
+            <a:r>
+              <a:rPr lang="en-US" sz="1400" dirty="0"/>
+              <a:t>    &lt;</a:t>
+            </a:r>
+            <a:r>
+              <a:rPr lang="en-US" sz="1400" b="1" dirty="0" err="1"/>
+              <a:t>project.reporting.outputEncoding</a:t>
+            </a:r>
+            <a:r>
+              <a:rPr lang="en-US" sz="1400" dirty="0"/>
+              <a:t>&gt;UTF-8&lt;/</a:t>
+            </a:r>
+            <a:r>
+              <a:rPr lang="en-US" sz="1400" b="1" dirty="0" err="1"/>
+              <a:t>project.reporting.outputEncoding</a:t>
+            </a:r>
+            <a:r>
+              <a:rPr lang="en-US" sz="1400" dirty="0"/>
+              <a:t>&gt;</a:t>
+            </a:r>
+            <a:br>
+              <a:rPr lang="en-US" sz="1400" dirty="0"/>
+            </a:br>
+            <a:r>
+              <a:rPr lang="en-US" sz="1400" dirty="0"/>
+              <a:t>    &lt;</a:t>
+            </a:r>
+            <a:r>
+              <a:rPr lang="en-US" sz="1400" b="1" dirty="0"/>
+              <a:t>fs</a:t>
+            </a:r>
+            <a:r>
+              <a:rPr lang="en-US" sz="1400" dirty="0"/>
+              <a:t>&gt;${</a:t>
+            </a:r>
+            <a:r>
+              <a:rPr lang="en-US" sz="1400" dirty="0" err="1"/>
+              <a:t>file.separator</a:t>
+            </a:r>
+            <a:r>
+              <a:rPr lang="en-US" sz="1400" dirty="0"/>
+              <a:t>}&lt;/</a:t>
+            </a:r>
+            <a:r>
+              <a:rPr lang="en-US" sz="1400" b="1" dirty="0"/>
+              <a:t>fs</a:t>
+            </a:r>
+            <a:r>
+              <a:rPr lang="en-US" sz="1400" dirty="0"/>
+              <a:t>&gt;</a:t>
+            </a:r>
+            <a:br>
+              <a:rPr lang="en-US" sz="1400" dirty="0"/>
+            </a:br>
+            <a:r>
+              <a:rPr lang="en-US" sz="1400" dirty="0"/>
+              <a:t>    &lt;</a:t>
+            </a:r>
+            <a:r>
+              <a:rPr lang="en-US" sz="1400" b="1" dirty="0" err="1"/>
+              <a:t>version.java</a:t>
+            </a:r>
+            <a:r>
+              <a:rPr lang="en-US" sz="1400" dirty="0"/>
+              <a:t>&gt;1.8&lt;/</a:t>
+            </a:r>
+            <a:r>
+              <a:rPr lang="en-US" sz="1400" b="1" dirty="0" err="1"/>
+              <a:t>version.java</a:t>
+            </a:r>
+            <a:r>
+              <a:rPr lang="en-US" sz="1400" dirty="0"/>
+              <a:t>&gt;</a:t>
+            </a:r>
+            <a:br>
+              <a:rPr lang="en-US" sz="1400" dirty="0"/>
+            </a:br>
+            <a:r>
+              <a:rPr lang="en-US" sz="1400" dirty="0"/>
+              <a:t>    &lt;</a:t>
+            </a:r>
+            <a:r>
+              <a:rPr lang="en-US" sz="1400" b="1" dirty="0" err="1"/>
+              <a:t>version.jacoco</a:t>
+            </a:r>
+            <a:r>
+              <a:rPr lang="en-US" sz="1400" dirty="0"/>
+              <a:t>&gt;0.7.9&lt;/</a:t>
+            </a:r>
+            <a:r>
+              <a:rPr lang="en-US" sz="1400" b="1" dirty="0" err="1"/>
+              <a:t>version.jacoco</a:t>
+            </a:r>
+            <a:r>
+              <a:rPr lang="en-US" sz="1400" dirty="0"/>
+              <a:t>&gt;</a:t>
+            </a:r>
+            <a:br>
+              <a:rPr lang="en-US" sz="1400" dirty="0"/>
+            </a:br>
+            <a:r>
+              <a:rPr lang="en-US" sz="1400" dirty="0"/>
+              <a:t>    &lt;</a:t>
+            </a:r>
+            <a:r>
+              <a:rPr lang="en-US" sz="1400" b="1" dirty="0" err="1"/>
+              <a:t>version.javax.el</a:t>
+            </a:r>
+            <a:r>
+              <a:rPr lang="en-US" sz="1400" dirty="0"/>
+              <a:t>&gt;2.2.4&lt;/</a:t>
+            </a:r>
+            <a:r>
+              <a:rPr lang="en-US" sz="1400" b="1" dirty="0" err="1"/>
+              <a:t>version.javax.el</a:t>
+            </a:r>
+            <a:r>
+              <a:rPr lang="en-US" sz="1400" dirty="0"/>
+              <a:t>&gt;</a:t>
+            </a:r>
+            <a:br>
+              <a:rPr lang="en-US" sz="1400" dirty="0"/>
+            </a:br>
+            <a:r>
+              <a:rPr lang="en-US" sz="1400" dirty="0"/>
+              <a:t>    &lt;</a:t>
+            </a:r>
+            <a:r>
+              <a:rPr lang="en-US" sz="1400" b="1" dirty="0" err="1"/>
+              <a:t>version.hibernate.jpa</a:t>
+            </a:r>
+            <a:r>
+              <a:rPr lang="en-US" sz="1400" dirty="0"/>
+              <a:t>&gt;1.0.0.Final&lt;/</a:t>
+            </a:r>
+            <a:r>
+              <a:rPr lang="en-US" sz="1400" b="1" dirty="0" err="1"/>
+              <a:t>version.hibernate.jpa</a:t>
+            </a:r>
+            <a:r>
+              <a:rPr lang="en-US" sz="1400" dirty="0"/>
+              <a:t>&gt;</a:t>
+            </a:r>
+            <a:br>
+              <a:rPr lang="en-US" sz="1400" dirty="0"/>
+            </a:br>
+            <a:r>
+              <a:rPr lang="en-US" sz="1400" dirty="0"/>
+              <a:t>    &lt;</a:t>
+            </a:r>
+            <a:r>
+              <a:rPr lang="en-US" sz="1400" b="1" dirty="0" err="1"/>
+              <a:t>version.hibernate.core</a:t>
+            </a:r>
+            <a:r>
+              <a:rPr lang="en-US" sz="1400" dirty="0"/>
+              <a:t>&gt;5.2.9.Final&lt;/</a:t>
+            </a:r>
+            <a:r>
+              <a:rPr lang="en-US" sz="1400" b="1" dirty="0" err="1"/>
+              <a:t>version.hibernate.core</a:t>
+            </a:r>
+            <a:r>
+              <a:rPr lang="en-US" sz="1400" dirty="0"/>
+              <a:t>&gt;</a:t>
+            </a:r>
+            <a:br>
+              <a:rPr lang="en-US" sz="1400" dirty="0"/>
+            </a:br>
+            <a:r>
+              <a:rPr lang="en-US" sz="1400" dirty="0"/>
+              <a:t>    &lt;</a:t>
+            </a:r>
+            <a:r>
+              <a:rPr lang="en-US" sz="1400" b="1" dirty="0" err="1"/>
+              <a:t>version.hibernate.validator</a:t>
+            </a:r>
+            <a:r>
+              <a:rPr lang="en-US" sz="1400" dirty="0"/>
+              <a:t>&gt;5.3.4.Final&lt;/</a:t>
+            </a:r>
+            <a:r>
+              <a:rPr lang="en-US" sz="1400" b="1" dirty="0" err="1"/>
+              <a:t>version.hibernate.validator</a:t>
+            </a:r>
+            <a:r>
+              <a:rPr lang="en-US" sz="1400" dirty="0"/>
+              <a:t>&gt;</a:t>
+            </a:r>
+            <a:br>
+              <a:rPr lang="en-US" sz="1400" dirty="0"/>
+            </a:br>
+            <a:r>
+              <a:rPr lang="en-US" sz="1400" dirty="0"/>
+              <a:t>    &lt;</a:t>
+            </a:r>
+            <a:r>
+              <a:rPr lang="en-US" sz="1400" b="1" dirty="0"/>
+              <a:t>version.h2</a:t>
+            </a:r>
+            <a:r>
+              <a:rPr lang="en-US" sz="1400" dirty="0"/>
+              <a:t>&gt;1.4.194&lt;/</a:t>
+            </a:r>
+            <a:r>
+              <a:rPr lang="en-US" sz="1400" b="1" dirty="0"/>
+              <a:t>version.h2</a:t>
+            </a:r>
+            <a:r>
+              <a:rPr lang="en-US" sz="1400" dirty="0"/>
+              <a:t>&gt;</a:t>
+            </a:r>
+            <a:br>
+              <a:rPr lang="en-US" sz="1400" dirty="0"/>
+            </a:br>
+            <a:r>
+              <a:rPr lang="en-US" sz="1400" dirty="0"/>
+              <a:t>    &lt;</a:t>
+            </a:r>
+            <a:r>
+              <a:rPr lang="en-US" sz="1400" b="1" dirty="0" err="1"/>
+              <a:t>version.postgres</a:t>
+            </a:r>
+            <a:r>
+              <a:rPr lang="en-US" sz="1400" dirty="0"/>
+              <a:t>&gt;42.1.4&lt;/</a:t>
+            </a:r>
+            <a:r>
+              <a:rPr lang="en-US" sz="1400" b="1" dirty="0" err="1"/>
+              <a:t>version.postgres</a:t>
+            </a:r>
+            <a:r>
+              <a:rPr lang="en-US" sz="1400" dirty="0"/>
+              <a:t>&gt;</a:t>
+            </a:r>
+            <a:br>
+              <a:rPr lang="en-US" sz="1400" dirty="0"/>
+            </a:br>
+            <a:r>
+              <a:rPr lang="en-US" sz="1400" dirty="0"/>
+              <a:t>    &lt;</a:t>
+            </a:r>
+            <a:r>
+              <a:rPr lang="en-US" sz="1400" b="1" dirty="0" err="1"/>
+              <a:t>version.resteasy</a:t>
+            </a:r>
+            <a:r>
+              <a:rPr lang="en-US" sz="1400" dirty="0"/>
+              <a:t>&gt;3.1.3.Final&lt;/</a:t>
+            </a:r>
+            <a:r>
+              <a:rPr lang="en-US" sz="1400" b="1" dirty="0" err="1"/>
+              <a:t>version.resteasy</a:t>
+            </a:r>
+            <a:r>
+              <a:rPr lang="en-US" sz="1400" dirty="0"/>
+              <a:t>&gt;</a:t>
+            </a:r>
+            <a:br>
+              <a:rPr lang="en-US" sz="1400" dirty="0"/>
+            </a:br>
+            <a:r>
+              <a:rPr lang="en-US" sz="1400" dirty="0"/>
+              <a:t>    &lt;</a:t>
+            </a:r>
+            <a:r>
+              <a:rPr lang="en-US" sz="1400" b="1" dirty="0" err="1"/>
+              <a:t>version.testcontainers</a:t>
+            </a:r>
+            <a:r>
+              <a:rPr lang="en-US" sz="1400" dirty="0"/>
+              <a:t>&gt;1.4.3&lt;/</a:t>
+            </a:r>
+            <a:r>
+              <a:rPr lang="en-US" sz="1400" b="1" dirty="0" err="1"/>
+              <a:t>version.testcontainers</a:t>
+            </a:r>
+            <a:r>
+              <a:rPr lang="en-US" sz="1400" dirty="0"/>
+              <a:t>&gt;</a:t>
+            </a:r>
+            <a:br>
+              <a:rPr lang="en-US" sz="1400" dirty="0"/>
+            </a:br>
+            <a:r>
+              <a:rPr lang="en-US" sz="1400" dirty="0"/>
+              <a:t>&lt;/</a:t>
+            </a:r>
+            <a:r>
+              <a:rPr lang="en-US" sz="1400" b="1" dirty="0"/>
+              <a:t>properties</a:t>
+            </a:r>
+            <a:r>
+              <a:rPr lang="en-US" sz="1400" dirty="0"/>
+              <a:t>&gt;</a:t>
+            </a:r>
+          </a:p>
+        </p:txBody>
+      </p:sp>
+      <p:sp>
+        <p:nvSpPr>
+          <p:cNvPr id="6" name="TextBox 5"/>
+          <p:cNvSpPr txBox="1"/>
+          <p:nvPr/>
+        </p:nvSpPr>
+        <p:spPr>
+          <a:xfrm>
+            <a:off x="7545788" y="1948069"/>
+            <a:ext cx="4036554" cy="2862322"/>
+          </a:xfrm>
+          <a:prstGeom prst="rect">
+            <a:avLst/>
+          </a:prstGeom>
+          <a:noFill/>
+        </p:spPr>
+        <p:txBody>
+          <a:bodyPr wrap="none" rtlCol="0">
+            <a:spAutoFit/>
+          </a:bodyPr>
+          <a:lstStyle/>
+          <a:p>
+            <a:r>
               <a:rPr lang="en-US" dirty="0"/>
               <a:t>&lt;</a:t>
             </a:r>
             <a:r>
-              <a:rPr lang="en-US" b="1" dirty="0" err="1"/>
-              <a:t>pluginManagement</a:t>
+              <a:rPr lang="en-US" b="1" dirty="0"/>
+              <a:t>dependency</a:t>
             </a:r>
             <a:r>
               <a:rPr lang="en-US" dirty="0"/>
@@ -10269,8 +10056,24 @@
               <a:t>    &lt;</a:t>
             </a:r>
             <a:r>
-              <a:rPr lang="en-US" b="1" dirty="0"/>
-              <a:t>plugins</a:t>
+              <a:rPr lang="en-US" b="1" dirty="0" err="1"/>
+              <a:t>groupId</a:t>
+            </a:r>
+            <a:r>
+              <a:rPr lang="en-US" dirty="0"/>
+              <a:t>&gt;</a:t>
+            </a:r>
+            <a:r>
+              <a:rPr lang="en-US" dirty="0" err="1"/>
+              <a:t>javax.el</a:t>
+            </a:r>
+            <a:r>
+              <a:rPr lang="en-US" dirty="0"/>
+              <a:t>&lt;/</a:t>
+            </a:r>
+            <a:r>
+              <a:rPr lang="en-US" b="1" dirty="0" err="1"/>
+              <a:t>groupId</a:t>
             </a:r>
             <a:r>
               <a:rPr lang="en-US" dirty="0"/>
@@ -10281,11 +10084,27 @@
             </a:br>
             <a:r>
               <a:rPr lang="en-US" dirty="0"/>
-              <a:t>        &lt;</a:t>
-            </a:r>
-            <a:r>
-              <a:rPr lang="en-US" b="1" dirty="0"/>
-              <a:t>plugin</a:t>
+              <a:t>    &lt;</a:t>
+            </a:r>
+            <a:r>
+              <a:rPr lang="en-US" b="1" dirty="0" err="1"/>
+              <a:t>artifactId</a:t>
+            </a:r>
+            <a:r>
+              <a:rPr lang="en-US" dirty="0"/>
+              <a:t>&gt;</a:t>
+            </a:r>
+            <a:r>
+              <a:rPr lang="en-US" dirty="0" err="1"/>
+              <a:t>javax.el-api</a:t>
+            </a:r>
+            <a:r>
+              <a:rPr lang="en-US" dirty="0"/>
+              <a:t>&lt;/</a:t>
+            </a:r>
+            <a:r>
+              <a:rPr lang="en-US" b="1" dirty="0" err="1"/>
+              <a:t>artifactId</a:t>
             </a:r>
             <a:r>
               <a:rPr lang="en-US" dirty="0"/>
@@ -10296,27 +10115,27 @@
             </a:br>
             <a:r>
               <a:rPr lang="en-US" dirty="0"/>
-              <a:t>            &lt;</a:t>
-            </a:r>
-            <a:r>
-              <a:rPr lang="en-US" b="1" dirty="0" err="1"/>
-              <a:t>groupId</a:t>
+              <a:t>    &lt;</a:t>
+            </a:r>
+            <a:r>
+              <a:rPr lang="en-US" b="1" dirty="0"/>
+              <a:t>version</a:t>
             </a:r>
             <a:r>
               <a:rPr lang="en-US" dirty="0"/>
-              <a:t>&gt;</a:t>
+              <a:t>&gt;${</a:t>
             </a:r>
             <a:r>
               <a:rPr lang="en-US" dirty="0" err="1"/>
-              <a:t>org.apache.maven.plugins</a:t>
+              <a:t>version.javax.el</a:t>
             </a:r>
             <a:r>
               <a:rPr lang="en-US" dirty="0"/>
-              <a:t>&lt;/</a:t>
-            </a:r>
-            <a:r>
-              <a:rPr lang="en-US" b="1" dirty="0" err="1"/>
-              <a:t>groupId</a:t>
+              <a:t>}&lt;/</a:t>
+            </a:r>
+            <a:r>
+              <a:rPr lang="en-US" b="1" dirty="0"/>
+              <a:t>version</a:t>
             </a:r>
             <a:r>
               <a:rPr lang="en-US" dirty="0"/>
@@ -10327,19 +10146,11 @@
             </a:br>
             <a:r>
               <a:rPr lang="en-US" dirty="0"/>
-              <a:t>            &lt;</a:t>
-            </a:r>
-            <a:r>
-              <a:rPr lang="en-US" b="1" dirty="0" err="1"/>
-              <a:t>artifactId</a:t>
-            </a:r>
-            <a:r>
-              <a:rPr lang="en-US" dirty="0"/>
-              <a:t>&gt;maven-compiler-plugin&lt;/</a:t>
-            </a:r>
-            <a:r>
-              <a:rPr lang="en-US" b="1" dirty="0" err="1"/>
-              <a:t>artifactId</a:t>
+              <a:t>&lt;/</a:t>
+            </a:r>
+            <a:r>
+              <a:rPr lang="en-US" b="1" dirty="0"/>
+              <a:t>dependency</a:t>
             </a:r>
             <a:r>
               <a:rPr lang="en-US" dirty="0"/>
@@ -10350,19 +10161,11 @@
             </a:br>
             <a:r>
               <a:rPr lang="en-US" dirty="0"/>
-              <a:t>            &lt;</a:t>
+              <a:t>&lt;</a:t>
             </a:r>
             <a:r>
               <a:rPr lang="en-US" b="1" dirty="0"/>
-              <a:t>version</a:t>
-            </a:r>
-            <a:r>
-              <a:rPr lang="en-US" dirty="0"/>
-              <a:t>&gt;3.1&lt;/</a:t>
-            </a:r>
-            <a:r>
-              <a:rPr lang="en-US" b="1" dirty="0"/>
-              <a:t>version</a:t>
+              <a:t>dependency</a:t>
             </a:r>
             <a:r>
               <a:rPr lang="en-US" dirty="0"/>
@@ -10373,19 +10176,27 @@
             </a:br>
             <a:r>
               <a:rPr lang="en-US" dirty="0"/>
-              <a:t>            &lt;</a:t>
-            </a:r>
-            <a:r>
-              <a:rPr lang="en-US" b="1" dirty="0"/>
-              <a:t>inherited</a:t>
+              <a:t>    &lt;</a:t>
+            </a:r>
+            <a:r>
+              <a:rPr lang="en-US" b="1" dirty="0" err="1"/>
+              <a:t>groupId</a:t>
             </a:r>
             <a:r>
               <a:rPr lang="en-US" dirty="0"/>
-              <a:t>&gt;true&lt;/</a:t>
-            </a:r>
-            <a:r>
-              <a:rPr lang="en-US" b="1" dirty="0"/>
-              <a:t>inherited</a:t>
+              <a:t>&gt;</a:t>
+            </a:r>
+            <a:r>
+              <a:rPr lang="en-US" dirty="0" err="1"/>
+              <a:t>org.glassfish.web</a:t>
+            </a:r>
+            <a:r>
+              <a:rPr lang="en-US" dirty="0"/>
+              <a:t>&lt;/</a:t>
+            </a:r>
+            <a:r>
+              <a:rPr lang="en-US" b="1" dirty="0" err="1"/>
+              <a:t>groupId</a:t>
             </a:r>
             <a:r>
               <a:rPr lang="en-US" dirty="0"/>
@@ -10396,11 +10207,27 @@
             </a:br>
             <a:r>
               <a:rPr lang="en-US" dirty="0"/>
-              <a:t>            &lt;</a:t>
-            </a:r>
-            <a:r>
-              <a:rPr lang="en-US" b="1" dirty="0"/>
-              <a:t>configuration</a:t>
+              <a:t>    &lt;</a:t>
+            </a:r>
+            <a:r>
+              <a:rPr lang="en-US" b="1" dirty="0" err="1"/>
+              <a:t>artifactId</a:t>
+            </a:r>
+            <a:r>
+              <a:rPr lang="en-US" dirty="0"/>
+              <a:t>&gt;</a:t>
+            </a:r>
+            <a:r>
+              <a:rPr lang="en-US" dirty="0" err="1"/>
+              <a:t>javax.el</a:t>
+            </a:r>
+            <a:r>
+              <a:rPr lang="en-US" dirty="0"/>
+              <a:t>&lt;/</a:t>
+            </a:r>
+            <a:r>
+              <a:rPr lang="en-US" b="1" dirty="0" err="1"/>
+              <a:t>artifactId</a:t>
             </a:r>
             <a:r>
               <a:rPr lang="en-US" dirty="0"/>
@@ -10411,27 +10238,27 @@
             </a:br>
             <a:r>
               <a:rPr lang="en-US" dirty="0"/>
-              <a:t>                &lt;</a:t>
-            </a:r>
-            <a:r>
-              <a:rPr lang="en-US" b="1" dirty="0" smtClean="0"/>
-              <a:t>source</a:t>
+              <a:t>    &lt;</a:t>
+            </a:r>
+            <a:r>
+              <a:rPr lang="en-US" b="1" dirty="0"/>
+              <a:t>version</a:t>
             </a:r>
             <a:r>
               <a:rPr lang="en-US" dirty="0"/>
-              <a:t>&gt; ${</a:t>
+              <a:t>&gt;${</a:t>
             </a:r>
             <a:r>
               <a:rPr lang="en-US" dirty="0" err="1"/>
-              <a:t>version.java</a:t>
+              <a:t>version.javax.el</a:t>
             </a:r>
             <a:r>
               <a:rPr lang="en-US" dirty="0"/>
-              <a:t>} &lt;/</a:t>
+              <a:t>}&lt;/</a:t>
             </a:r>
             <a:r>
               <a:rPr lang="en-US" b="1" dirty="0"/>
-              <a:t>source</a:t>
+              <a:t>version</a:t>
             </a:r>
             <a:r>
               <a:rPr lang="en-US" dirty="0"/>
@@ -10442,73 +10269,23 @@
             </a:br>
             <a:r>
               <a:rPr lang="en-US" dirty="0"/>
-              <a:t>                &lt;</a:t>
-            </a:r>
-            <a:r>
-              <a:rPr lang="en-US" b="1" dirty="0" smtClean="0"/>
-              <a:t>target</a:t>
-            </a:r>
-            <a:r>
-              <a:rPr lang="en-US" dirty="0"/>
-              <a:t>&gt; ${</a:t>
-            </a:r>
-            <a:r>
-              <a:rPr lang="en-US" dirty="0" err="1"/>
-              <a:t>version.java</a:t>
-            </a:r>
-            <a:r>
-              <a:rPr lang="en-US" dirty="0"/>
-              <a:t>} &lt;/</a:t>
+              <a:t>&lt;/</a:t>
             </a:r>
             <a:r>
               <a:rPr lang="en-US" b="1" dirty="0"/>
-              <a:t>target</a:t>
+              <a:t>dependency</a:t>
             </a:r>
             <a:r>
               <a:rPr lang="en-US" dirty="0"/>
               <a:t>&gt;</a:t>
             </a:r>
-            <a:br>
-              <a:rPr lang="en-US" dirty="0"/>
-            </a:br>
-            <a:r>
-              <a:rPr lang="en-US" dirty="0"/>
-              <a:t>            &lt;/</a:t>
-            </a:r>
-            <a:r>
-              <a:rPr lang="en-US" b="1" dirty="0"/>
-              <a:t>configuration</a:t>
-            </a:r>
-            <a:r>
-              <a:rPr lang="en-US" dirty="0"/>
-              <a:t>&gt;</a:t>
-            </a:r>
-            <a:br>
-              <a:rPr lang="en-US" dirty="0"/>
-            </a:br>
-            <a:r>
-              <a:rPr lang="en-US" dirty="0"/>
-              <a:t>        &lt;/</a:t>
-            </a:r>
-            <a:r>
-              <a:rPr lang="en-US" b="1" dirty="0"/>
-              <a:t>plugin</a:t>
-            </a:r>
-            <a:r>
-              <a:rPr lang="en-US" dirty="0"/>
-              <a:t>&gt;</a:t>
-            </a:r>
-            <a:br>
-              <a:rPr lang="en-US" dirty="0"/>
-            </a:br>
-            <a:endParaRPr lang="en-US" dirty="0"/>
           </a:p>
         </p:txBody>
       </p:sp>
     </p:spTree>
     <p:extLst>
       <p:ext uri="{BB962C8B-B14F-4D97-AF65-F5344CB8AC3E}">
-        <p14:creationId xmlns:p14="http://schemas.microsoft.com/office/powerpoint/2010/main" val="1735413327"/>
+        <p14:creationId xmlns:p14="http://schemas.microsoft.com/office/powerpoint/2010/main" val="999469944"/>
       </p:ext>
     </p:extLst>
   </p:cSld>
@@ -10687,7 +10464,7 @@
           <a:p>
             <a:r>
               <a:rPr lang="en-US" dirty="0" smtClean="0"/>
-              <a:t>Surefire and Failsafe</a:t>
+              <a:t>Plugins</a:t>
             </a:r>
             <a:endParaRPr lang="en-US" dirty="0"/>
           </a:p>
@@ -10705,169 +10482,321 @@
         </p:nvSpPr>
         <p:spPr>
           <a:xfrm>
-            <a:off x="838200" y="1825625"/>
-            <a:ext cx="10515600" cy="4813714"/>
+            <a:off x="361122" y="1777917"/>
+            <a:ext cx="6516756" cy="4885276"/>
           </a:xfrm>
         </p:spPr>
         <p:txBody>
           <a:bodyPr>
-            <a:normAutofit lnSpcReduction="10000"/>
+            <a:normAutofit/>
           </a:bodyPr>
           <a:lstStyle/>
           <a:p>
             <a:r>
               <a:rPr lang="en-US" dirty="0" smtClean="0"/>
-              <a:t>Surefire: plugin to run </a:t>
-            </a:r>
-            <a:r>
-              <a:rPr lang="en-US" i="1" dirty="0" smtClean="0"/>
-              <a:t>unit</a:t>
-            </a:r>
-            <a:r>
-              <a:rPr lang="en-US" dirty="0" smtClean="0"/>
-              <a:t> tests</a:t>
+              <a:t>Used to extend the functionalities of Maven</a:t>
+            </a:r>
+          </a:p>
+          <a:p>
+            <a:r>
+              <a:rPr lang="en-US" dirty="0" smtClean="0"/>
+              <a:t>Plugins are downloaded and configured like any third-party library</a:t>
+            </a:r>
+          </a:p>
+          <a:p>
+            <a:r>
+              <a:rPr lang="en-US" dirty="0" smtClean="0"/>
+              <a:t>Many of the base functionalities of Maven are themselves represented as plugins</a:t>
             </a:r>
           </a:p>
           <a:p>
             <a:pPr lvl="1"/>
             <a:r>
-              <a:rPr lang="en-US" dirty="0" smtClean="0"/>
-              <a:t>By default, all files in </a:t>
-            </a:r>
-            <a:r>
               <a:rPr lang="en-US" dirty="0" err="1" smtClean="0"/>
-              <a:t>src</a:t>
-            </a:r>
-            <a:r>
-              <a:rPr lang="en-US" dirty="0" smtClean="0"/>
-              <a:t>/main/test with name pattern *</a:t>
-            </a:r>
-            <a:r>
-              <a:rPr lang="en-US" dirty="0" err="1" smtClean="0"/>
-              <a:t>Test.java</a:t>
-            </a:r>
-            <a:endParaRPr lang="en-US" dirty="0" smtClean="0"/>
-          </a:p>
-          <a:p>
-            <a:pPr lvl="1"/>
-            <a:r>
-              <a:rPr lang="en-US" dirty="0" smtClean="0"/>
-              <a:t>Unit tests are run before the </a:t>
+              <a:t>Eg</a:t>
+            </a:r>
+            <a:r>
+              <a:rPr lang="en-US" dirty="0" smtClean="0"/>
+              <a:t>, compile Java code</a:t>
+            </a:r>
+            <a:endParaRPr lang="en-US" dirty="0"/>
+          </a:p>
+        </p:txBody>
+      </p:sp>
+      <p:sp>
+        <p:nvSpPr>
+          <p:cNvPr id="4" name="TextBox 3"/>
+          <p:cNvSpPr txBox="1"/>
+          <p:nvPr/>
+        </p:nvSpPr>
+        <p:spPr>
+          <a:xfrm>
+            <a:off x="6875993" y="1777917"/>
+            <a:ext cx="5316007" cy="3693319"/>
+          </a:xfrm>
+          <a:prstGeom prst="rect">
+            <a:avLst/>
+          </a:prstGeom>
+          <a:noFill/>
+        </p:spPr>
+        <p:txBody>
+          <a:bodyPr wrap="none" rtlCol="0">
+            <a:spAutoFit/>
+          </a:bodyPr>
+          <a:lstStyle/>
+          <a:p>
+            <a:r>
+              <a:rPr lang="en-US" dirty="0"/>
+              <a:t>&lt;</a:t>
+            </a:r>
+            <a:r>
+              <a:rPr lang="en-US" b="1" dirty="0" err="1"/>
+              <a:t>pluginManagement</a:t>
+            </a:r>
+            <a:r>
+              <a:rPr lang="en-US" dirty="0"/>
+              <a:t>&gt;</a:t>
+            </a:r>
+            <a:br>
+              <a:rPr lang="en-US" dirty="0"/>
+            </a:br>
+            <a:r>
+              <a:rPr lang="en-US" dirty="0"/>
+              <a:t>    &lt;</a:t>
+            </a:r>
+            <a:r>
+              <a:rPr lang="en-US" b="1" dirty="0"/>
+              <a:t>plugins</a:t>
+            </a:r>
+            <a:r>
+              <a:rPr lang="en-US" dirty="0"/>
+              <a:t>&gt;</a:t>
+            </a:r>
+            <a:br>
+              <a:rPr lang="en-US" dirty="0"/>
+            </a:br>
+            <a:r>
+              <a:rPr lang="en-US" dirty="0"/>
+              <a:t>        &lt;</a:t>
+            </a:r>
+            <a:r>
+              <a:rPr lang="en-US" b="1" dirty="0"/>
+              <a:t>plugin</a:t>
+            </a:r>
+            <a:r>
+              <a:rPr lang="en-US" dirty="0"/>
+              <a:t>&gt;</a:t>
+            </a:r>
+            <a:br>
+              <a:rPr lang="en-US" dirty="0"/>
+            </a:br>
+            <a:r>
+              <a:rPr lang="en-US" dirty="0"/>
+              <a:t>            &lt;</a:t>
+            </a:r>
+            <a:r>
+              <a:rPr lang="en-US" b="1" dirty="0" err="1"/>
+              <a:t>groupId</a:t>
+            </a:r>
+            <a:r>
+              <a:rPr lang="en-US" dirty="0"/>
+              <a:t>&gt;</a:t>
+            </a:r>
+            <a:r>
+              <a:rPr lang="en-US" dirty="0" err="1"/>
+              <a:t>org.apache.maven.plugins</a:t>
+            </a:r>
+            <a:r>
+              <a:rPr lang="en-US" dirty="0"/>
+              <a:t>&lt;/</a:t>
+            </a:r>
+            <a:r>
+              <a:rPr lang="en-US" b="1" dirty="0" err="1"/>
+              <a:t>groupId</a:t>
+            </a:r>
+            <a:r>
+              <a:rPr lang="en-US" dirty="0"/>
+              <a:t>&gt;</a:t>
+            </a:r>
+            <a:br>
+              <a:rPr lang="en-US" dirty="0"/>
+            </a:br>
+            <a:r>
+              <a:rPr lang="en-US" dirty="0"/>
+              <a:t>            &lt;</a:t>
+            </a:r>
+            <a:r>
+              <a:rPr lang="en-US" b="1" dirty="0" err="1"/>
+              <a:t>artifactId</a:t>
+            </a:r>
+            <a:r>
+              <a:rPr lang="en-US" dirty="0"/>
+              <a:t>&gt;maven-compiler-plugin&lt;/</a:t>
+            </a:r>
+            <a:r>
+              <a:rPr lang="en-US" b="1" dirty="0" err="1"/>
+              <a:t>artifactId</a:t>
+            </a:r>
+            <a:r>
+              <a:rPr lang="en-US" dirty="0"/>
+              <a:t>&gt;</a:t>
+            </a:r>
+            <a:br>
+              <a:rPr lang="en-US" dirty="0"/>
+            </a:br>
+            <a:r>
+              <a:rPr lang="en-US" dirty="0"/>
+              <a:t>            &lt;</a:t>
+            </a:r>
+            <a:r>
+              <a:rPr lang="en-US" b="1" dirty="0"/>
+              <a:t>version</a:t>
+            </a:r>
+            <a:r>
+              <a:rPr lang="en-US" dirty="0"/>
+              <a:t>&gt;3.1&lt;/</a:t>
+            </a:r>
+            <a:r>
+              <a:rPr lang="en-US" b="1" dirty="0"/>
+              <a:t>version</a:t>
+            </a:r>
+            <a:r>
+              <a:rPr lang="en-US" dirty="0"/>
+              <a:t>&gt;</a:t>
+            </a:r>
+            <a:br>
+              <a:rPr lang="en-US" dirty="0"/>
+            </a:br>
+            <a:r>
+              <a:rPr lang="en-US" dirty="0"/>
+              <a:t>            &lt;</a:t>
+            </a:r>
+            <a:r>
+              <a:rPr lang="en-US" b="1" dirty="0"/>
+              <a:t>inherited</a:t>
+            </a:r>
+            <a:r>
+              <a:rPr lang="en-US" dirty="0"/>
+              <a:t>&gt;true&lt;/</a:t>
+            </a:r>
+            <a:r>
+              <a:rPr lang="en-US" b="1" dirty="0"/>
+              <a:t>inherited</a:t>
+            </a:r>
+            <a:r>
+              <a:rPr lang="en-US" dirty="0"/>
+              <a:t>&gt;</a:t>
+            </a:r>
+            <a:br>
+              <a:rPr lang="en-US" dirty="0"/>
+            </a:br>
+            <a:r>
+              <a:rPr lang="en-US" dirty="0"/>
+              <a:t>            &lt;</a:t>
+            </a:r>
+            <a:r>
+              <a:rPr lang="en-US" b="1" dirty="0"/>
+              <a:t>configuration</a:t>
+            </a:r>
+            <a:r>
+              <a:rPr lang="en-US" dirty="0"/>
+              <a:t>&gt;</a:t>
+            </a:r>
+            <a:br>
+              <a:rPr lang="en-US" dirty="0"/>
+            </a:br>
+            <a:r>
+              <a:rPr lang="en-US" dirty="0"/>
+              <a:t>                &lt;</a:t>
             </a:r>
             <a:r>
               <a:rPr lang="en-US" b="1" dirty="0" smtClean="0"/>
-              <a:t>package</a:t>
-            </a:r>
-            <a:r>
-              <a:rPr lang="en-US" dirty="0" smtClean="0"/>
-              <a:t> phase</a:t>
-            </a:r>
-          </a:p>
-          <a:p>
-            <a:r>
-              <a:rPr lang="en-US" dirty="0" smtClean="0"/>
-              <a:t>Failsafe</a:t>
+              <a:t>source</a:t>
             </a:r>
             <a:r>
               <a:rPr lang="en-US" dirty="0"/>
-              <a:t>: plugin to run </a:t>
-            </a:r>
-            <a:r>
-              <a:rPr lang="en-US" i="1" dirty="0" smtClean="0"/>
-              <a:t>integration </a:t>
-            </a:r>
-            <a:r>
-              <a:rPr lang="en-US" dirty="0" smtClean="0"/>
-              <a:t>tests</a:t>
-            </a:r>
-            <a:endParaRPr lang="en-US" dirty="0"/>
-          </a:p>
-          <a:p>
-            <a:pPr lvl="1"/>
+              <a:t>&gt; ${</a:t>
+            </a:r>
+            <a:r>
+              <a:rPr lang="en-US" dirty="0" err="1"/>
+              <a:t>version.java</a:t>
+            </a:r>
             <a:r>
               <a:rPr lang="en-US" dirty="0"/>
-              <a:t>By default, all files in </a:t>
+              <a:t>} &lt;/</a:t>
+            </a:r>
+            <a:r>
+              <a:rPr lang="en-US" b="1" dirty="0"/>
+              <a:t>source</a:t>
+            </a:r>
+            <a:r>
+              <a:rPr lang="en-US" dirty="0"/>
+              <a:t>&gt;</a:t>
+            </a:r>
+            <a:br>
+              <a:rPr lang="en-US" dirty="0"/>
+            </a:br>
+            <a:r>
+              <a:rPr lang="en-US" dirty="0"/>
+              <a:t>                &lt;</a:t>
+            </a:r>
+            <a:r>
+              <a:rPr lang="en-US" b="1" dirty="0" smtClean="0"/>
+              <a:t>target</a:t>
+            </a:r>
+            <a:r>
+              <a:rPr lang="en-US" dirty="0"/>
+              <a:t>&gt; ${</a:t>
             </a:r>
             <a:r>
               <a:rPr lang="en-US" dirty="0" err="1"/>
-              <a:t>src</a:t>
+              <a:t>version.java</a:t>
             </a:r>
             <a:r>
               <a:rPr lang="en-US" dirty="0"/>
-              <a:t>/main/test with name pattern </a:t>
-            </a:r>
-            <a:r>
-              <a:rPr lang="en-US" dirty="0" smtClean="0"/>
-              <a:t>*</a:t>
-            </a:r>
-            <a:r>
-              <a:rPr lang="en-US" dirty="0" err="1" smtClean="0"/>
-              <a:t>IT.java</a:t>
-            </a:r>
-            <a:endParaRPr lang="en-US" dirty="0"/>
-          </a:p>
-          <a:p>
-            <a:pPr lvl="1"/>
-            <a:r>
-              <a:rPr lang="en-US" dirty="0" smtClean="0"/>
-              <a:t>Integration </a:t>
+              <a:t>} &lt;/</a:t>
+            </a:r>
+            <a:r>
+              <a:rPr lang="en-US" b="1" dirty="0"/>
+              <a:t>target</a:t>
             </a:r>
             <a:r>
               <a:rPr lang="en-US" dirty="0"/>
-              <a:t>tests are run </a:t>
-            </a:r>
-            <a:r>
-              <a:rPr lang="en-US" dirty="0" smtClean="0"/>
-              <a:t>after </a:t>
-            </a:r>
-            <a:r>
+              <a:t>&gt;</a:t>
+            </a:r>
+            <a:br>
               <a:rPr lang="en-US" dirty="0"/>
-              <a:t>the </a:t>
+            </a:br>
+            <a:r>
+              <a:rPr lang="en-US" dirty="0"/>
+              <a:t>            &lt;/</a:t>
             </a:r>
             <a:r>
               <a:rPr lang="en-US" b="1" dirty="0"/>
-              <a:t>package</a:t>
+              <a:t>configuration</a:t>
             </a:r>
             <a:r>
               <a:rPr lang="en-US" dirty="0"/>
-              <a:t> </a:t>
-            </a:r>
-            <a:r>
-              <a:rPr lang="en-US" dirty="0" smtClean="0"/>
-              <a:t>phase, so can use the packaged JAR/WAR files</a:t>
-            </a:r>
-          </a:p>
-          <a:p>
-            <a:r>
-              <a:rPr lang="en-US" dirty="0" smtClean="0"/>
-              <a:t>Note: in both cases, still writing them with JUnit</a:t>
-            </a:r>
-          </a:p>
-          <a:p>
-            <a:r>
-              <a:rPr lang="en-US" b="1" dirty="0" smtClean="0"/>
-              <a:t>WARNING</a:t>
-            </a:r>
-            <a:r>
-              <a:rPr lang="en-US" dirty="0" smtClean="0"/>
-              <a:t>: If you misspell *</a:t>
-            </a:r>
-            <a:r>
-              <a:rPr lang="en-US" dirty="0" err="1" smtClean="0"/>
-              <a:t>Test.java</a:t>
-            </a:r>
-            <a:r>
-              <a:rPr lang="en-US" dirty="0" smtClean="0"/>
-              <a:t>/*</a:t>
-            </a:r>
-            <a:r>
-              <a:rPr lang="en-US" dirty="0" err="1" smtClean="0"/>
-              <a:t>IT.java</a:t>
-            </a:r>
-            <a:r>
-              <a:rPr lang="en-US" dirty="0" smtClean="0"/>
-              <a:t>, tests will not run from Maven</a:t>
-            </a:r>
+              <a:t>&gt;</a:t>
+            </a:r>
+            <a:br>
+              <a:rPr lang="en-US" dirty="0"/>
+            </a:br>
+            <a:r>
+              <a:rPr lang="en-US" dirty="0"/>
+              <a:t>        &lt;/</a:t>
+            </a:r>
+            <a:r>
+              <a:rPr lang="en-US" b="1" dirty="0"/>
+              <a:t>plugin</a:t>
+            </a:r>
+            <a:r>
+              <a:rPr lang="en-US" dirty="0"/>
+              <a:t>&gt;</a:t>
+            </a:r>
+            <a:br>
+              <a:rPr lang="en-US" dirty="0"/>
+            </a:br>
             <a:endParaRPr lang="en-US" dirty="0"/>
           </a:p>
         </p:txBody>
@@ -10875,7 +10804,7 @@
     </p:spTree>
     <p:extLst>
       <p:ext uri="{BB962C8B-B14F-4D97-AF65-F5344CB8AC3E}">
-        <p14:creationId xmlns:p14="http://schemas.microsoft.com/office/powerpoint/2010/main" val="1211123220"/>
+        <p14:creationId xmlns:p14="http://schemas.microsoft.com/office/powerpoint/2010/main" val="1735413327"/>
       </p:ext>
     </p:extLst>
   </p:cSld>
@@ -10919,15 +10848,7 @@
           <a:p>
             <a:r>
               <a:rPr lang="en-US" dirty="0" smtClean="0"/>
-              <a:t>Build Course </a:t>
-            </a:r>
-            <a:r>
-              <a:rPr lang="en-US" dirty="0" err="1" smtClean="0"/>
-              <a:t>Git</a:t>
-            </a:r>
-            <a:r>
-              <a:rPr lang="en-US" dirty="0" smtClean="0"/>
-              <a:t> for First Time</a:t>
+              <a:t>Surefire and Failsafe</a:t>
             </a:r>
             <a:endParaRPr lang="en-US" dirty="0"/>
           </a:p>
@@ -10946,101 +10867,168 @@
         <p:spPr>
           <a:xfrm>
             <a:off x="838200" y="1825625"/>
-            <a:ext cx="10515600" cy="4790328"/>
+            <a:ext cx="10515600" cy="4813714"/>
           </a:xfrm>
         </p:spPr>
         <p:txBody>
-          <a:bodyPr/>
-          <a:lstStyle/>
-          <a:p>
-            <a:r>
-              <a:rPr lang="en-US" dirty="0" smtClean="0"/>
-              <a:t>From root folder: “</a:t>
-            </a:r>
-            <a:r>
-              <a:rPr lang="en-US" b="1" dirty="0" err="1" smtClean="0"/>
-              <a:t>mvn</a:t>
-            </a:r>
-            <a:r>
-              <a:rPr lang="en-US" b="1" dirty="0" smtClean="0"/>
-              <a:t> clean install -</a:t>
-            </a:r>
-            <a:r>
-              <a:rPr lang="en-US" b="1" dirty="0" err="1" smtClean="0"/>
-              <a:t>DskipTests</a:t>
-            </a:r>
-            <a:r>
-              <a:rPr lang="en-US" dirty="0" smtClean="0"/>
-              <a:t>”</a:t>
-            </a:r>
-          </a:p>
-          <a:p>
-            <a:r>
-              <a:rPr lang="en-US" dirty="0" smtClean="0"/>
-              <a:t>It will recursively build all the modules</a:t>
-            </a:r>
-          </a:p>
-          <a:p>
-            <a:r>
-              <a:rPr lang="en-US" b="1" dirty="0"/>
-              <a:t>c</a:t>
-            </a:r>
-            <a:r>
-              <a:rPr lang="en-US" b="1" dirty="0" smtClean="0"/>
-              <a:t>lean</a:t>
-            </a:r>
-            <a:r>
-              <a:rPr lang="en-US" dirty="0" smtClean="0"/>
-              <a:t>: just make sure you start from a clean state</a:t>
-            </a:r>
-          </a:p>
-          <a:p>
-            <a:r>
-              <a:rPr lang="en-US" b="1" dirty="0"/>
-              <a:t>i</a:t>
-            </a:r>
-            <a:r>
-              <a:rPr lang="en-US" b="1" dirty="0" smtClean="0"/>
-              <a:t>nstall</a:t>
-            </a:r>
-            <a:r>
-              <a:rPr lang="en-US" dirty="0" smtClean="0"/>
-              <a:t>: it executes all previous phases, including </a:t>
-            </a:r>
-            <a:r>
-              <a:rPr lang="en-US" b="1" dirty="0" smtClean="0"/>
-              <a:t>compile</a:t>
-            </a:r>
-            <a:r>
-              <a:rPr lang="en-US" dirty="0" smtClean="0"/>
-              <a:t> and </a:t>
+          <a:bodyPr>
+            <a:normAutofit lnSpcReduction="10000"/>
+          </a:bodyPr>
+          <a:lstStyle/>
+          <a:p>
+            <a:r>
+              <a:rPr lang="en-US" dirty="0" smtClean="0"/>
+              <a:t>Surefire: plugin to run </a:t>
+            </a:r>
+            <a:r>
+              <a:rPr lang="en-US" i="1" dirty="0" smtClean="0"/>
+              <a:t>unit</a:t>
+            </a:r>
+            <a:r>
+              <a:rPr lang="en-US" dirty="0" smtClean="0"/>
+              <a:t> tests</a:t>
+            </a:r>
+          </a:p>
+          <a:p>
+            <a:pPr lvl="1"/>
+            <a:r>
+              <a:rPr lang="en-US" dirty="0" smtClean="0"/>
+              <a:t>By default, all files in </a:t>
+            </a:r>
+            <a:r>
+              <a:rPr lang="en-US" dirty="0" err="1" smtClean="0"/>
+              <a:t>src</a:t>
+            </a:r>
+            <a:r>
+              <a:rPr lang="en-US" dirty="0" smtClean="0"/>
+              <a:t>/main/test with name pattern *</a:t>
+            </a:r>
+            <a:r>
+              <a:rPr lang="en-US" dirty="0" err="1" smtClean="0"/>
+              <a:t>Test.java</a:t>
+            </a:r>
+            <a:endParaRPr lang="en-US" dirty="0" smtClean="0"/>
+          </a:p>
+          <a:p>
+            <a:pPr lvl="1"/>
+            <a:r>
+              <a:rPr lang="en-US" dirty="0" smtClean="0"/>
+              <a:t>Unit tests are run before the </a:t>
             </a:r>
             <a:r>
               <a:rPr lang="en-US" b="1" dirty="0" smtClean="0"/>
               <a:t>package</a:t>
             </a:r>
-          </a:p>
-          <a:p>
+            <a:r>
+              <a:rPr lang="en-US" dirty="0" smtClean="0"/>
+              <a:t> phase</a:t>
+            </a:r>
+          </a:p>
+          <a:p>
+            <a:r>
+              <a:rPr lang="en-US" dirty="0" smtClean="0"/>
+              <a:t>Failsafe</a:t>
+            </a:r>
+            <a:r>
+              <a:rPr lang="en-US" dirty="0"/>
+              <a:t>: plugin to run </a:t>
+            </a:r>
+            <a:r>
+              <a:rPr lang="en-US" i="1" dirty="0" smtClean="0"/>
+              <a:t>integration </a:t>
+            </a:r>
+            <a:r>
+              <a:rPr lang="en-US" dirty="0" smtClean="0"/>
+              <a:t>tests</a:t>
+            </a:r>
+            <a:endParaRPr lang="en-US" dirty="0"/>
+          </a:p>
+          <a:p>
+            <a:pPr lvl="1"/>
+            <a:r>
+              <a:rPr lang="en-US" dirty="0"/>
+              <a:t>By default, all files in </a:t>
+            </a:r>
+            <a:r>
+              <a:rPr lang="en-US" dirty="0" err="1"/>
+              <a:t>src</a:t>
+            </a:r>
+            <a:r>
+              <a:rPr lang="en-US" dirty="0"/>
+              <a:t>/main/test with name pattern </a:t>
+            </a:r>
+            <a:r>
+              <a:rPr lang="en-US" dirty="0" smtClean="0"/>
+              <a:t>*</a:t>
+            </a:r>
+            <a:r>
+              <a:rPr lang="en-US" dirty="0" err="1" smtClean="0"/>
+              <a:t>IT.java</a:t>
+            </a:r>
+            <a:endParaRPr lang="en-US" dirty="0"/>
+          </a:p>
+          <a:p>
+            <a:pPr lvl="1"/>
+            <a:r>
+              <a:rPr lang="en-US" dirty="0" smtClean="0"/>
+              <a:t>Integration </a:t>
+            </a:r>
+            <a:r>
+              <a:rPr lang="en-US" dirty="0"/>
+              <a:t>tests are run </a:t>
+            </a:r>
+            <a:r>
+              <a:rPr lang="en-US" dirty="0" smtClean="0"/>
+              <a:t>after </a:t>
+            </a:r>
+            <a:r>
+              <a:rPr lang="en-US" dirty="0"/>
+              <a:t>the </a:t>
+            </a:r>
             <a:r>
               <a:rPr lang="en-US" b="1" dirty="0"/>
-              <a:t>-</a:t>
-            </a:r>
-            <a:r>
-              <a:rPr lang="en-US" b="1" dirty="0" err="1" smtClean="0"/>
-              <a:t>DskipTests</a:t>
-            </a:r>
-            <a:r>
-              <a:rPr lang="en-US" dirty="0" smtClean="0"/>
-              <a:t>: avoid running tests</a:t>
-            </a:r>
-          </a:p>
-          <a:p>
-            <a:r>
-              <a:rPr lang="en-US" dirty="0" smtClean="0"/>
-              <a:t>WARNING: first time, it will take a long while, as many libraries will need to be downloaded</a:t>
-            </a:r>
-          </a:p>
-          <a:p>
+              <a:t>package</a:t>
+            </a:r>
+            <a:r>
+              <a:rPr lang="en-US" dirty="0"/>
+              <a:t> </a:t>
+            </a:r>
+            <a:r>
+              <a:rPr lang="en-US" dirty="0" smtClean="0"/>
+              <a:t>phase, so can use the packaged JAR/WAR files</a:t>
+            </a:r>
+          </a:p>
+          <a:p>
+            <a:r>
+              <a:rPr lang="en-US" dirty="0" smtClean="0"/>
+              <a:t>Note: in both cases, still writing them with JUnit</a:t>
+            </a:r>
+          </a:p>
+          <a:p>
+            <a:r>
+              <a:rPr lang="en-US" b="1" dirty="0" smtClean="0"/>
+              <a:t>WARNING</a:t>
+            </a:r>
+            <a:r>
+              <a:rPr lang="en-US" dirty="0" smtClean="0"/>
+              <a:t>: If you misspell *</a:t>
+            </a:r>
+            <a:r>
+              <a:rPr lang="en-US" dirty="0" err="1" smtClean="0"/>
+              <a:t>Test.java</a:t>
+            </a:r>
+            <a:r>
+              <a:rPr lang="en-US" dirty="0" smtClean="0"/>
+              <a:t>/*</a:t>
+            </a:r>
+            <a:r>
+              <a:rPr lang="en-US" dirty="0" err="1" smtClean="0"/>
+              <a:t>IT.java</a:t>
+            </a:r>
+            <a:r>
+              <a:rPr lang="en-US" dirty="0" smtClean="0"/>
+              <a:t>, tests will not run from Maven</a:t>
+            </a:r>
             <a:endParaRPr lang="en-US" dirty="0"/>
           </a:p>
         </p:txBody>
@@ -11048,7 +11036,7 @@
     </p:spTree>
     <p:extLst>
       <p:ext uri="{BB962C8B-B14F-4D97-AF65-F5344CB8AC3E}">
-        <p14:creationId xmlns:p14="http://schemas.microsoft.com/office/powerpoint/2010/main" val="465377794"/>
+        <p14:creationId xmlns:p14="http://schemas.microsoft.com/office/powerpoint/2010/main" val="1211123220"/>
       </p:ext>
     </p:extLst>
   </p:cSld>
@@ -11092,7 +11080,15 @@
           <a:p>
             <a:r>
               <a:rPr lang="en-US" dirty="0" smtClean="0"/>
-              <a:t>JPA: Java Persistence API</a:t>
+              <a:t>Build Course </a:t>
+            </a:r>
+            <a:r>
+              <a:rPr lang="en-US" dirty="0" err="1" smtClean="0"/>
+              <a:t>Git</a:t>
+            </a:r>
+            <a:r>
+              <a:rPr lang="en-US" dirty="0" smtClean="0"/>
+              <a:t> for First Time</a:t>
             </a:r>
             <a:endParaRPr lang="en-US" dirty="0"/>
           </a:p>
@@ -11100,27 +11096,120 @@
       </p:sp>
       <p:sp>
         <p:nvSpPr>
-          <p:cNvPr id="3" name="Text Placeholder 2"/>
-          <p:cNvSpPr>
-            <a:spLocks noGrp="1"/>
-          </p:cNvSpPr>
-          <p:nvPr>
-            <p:ph type="body" idx="1"/>
-          </p:nvPr>
-        </p:nvSpPr>
-        <p:spPr/>
+          <p:cNvPr id="3" name="Content Placeholder 2"/>
+          <p:cNvSpPr>
+            <a:spLocks noGrp="1"/>
+          </p:cNvSpPr>
+          <p:nvPr>
+            <p:ph idx="1"/>
+          </p:nvPr>
+        </p:nvSpPr>
+        <p:spPr>
+          <a:xfrm>
+            <a:off x="838200" y="1825625"/>
+            <a:ext cx="10515600" cy="4790328"/>
+          </a:xfrm>
+        </p:spPr>
         <p:txBody>
           <a:bodyPr/>
           <a:lstStyle/>
           <a:p>
-            <a:endParaRPr lang="en-US"/>
+            <a:r>
+              <a:rPr lang="en-US" dirty="0" smtClean="0"/>
+              <a:t>From root folder: “</a:t>
+            </a:r>
+            <a:r>
+              <a:rPr lang="en-US" b="1" dirty="0" err="1" smtClean="0"/>
+              <a:t>mvn</a:t>
+            </a:r>
+            <a:r>
+              <a:rPr lang="en-US" b="1" dirty="0" smtClean="0"/>
+              <a:t> clean install -</a:t>
+            </a:r>
+            <a:r>
+              <a:rPr lang="en-US" b="1" dirty="0" err="1" smtClean="0"/>
+              <a:t>DskipTests</a:t>
+            </a:r>
+            <a:r>
+              <a:rPr lang="en-US" dirty="0" smtClean="0"/>
+              <a:t>”</a:t>
+            </a:r>
+          </a:p>
+          <a:p>
+            <a:r>
+              <a:rPr lang="en-US" dirty="0" smtClean="0"/>
+              <a:t>It will recursively build all the modules</a:t>
+            </a:r>
+          </a:p>
+          <a:p>
+            <a:r>
+              <a:rPr lang="en-US" b="1" dirty="0"/>
+              <a:t>c</a:t>
+            </a:r>
+            <a:r>
+              <a:rPr lang="en-US" b="1" dirty="0" smtClean="0"/>
+              <a:t>lean</a:t>
+            </a:r>
+            <a:r>
+              <a:rPr lang="en-US" dirty="0" smtClean="0"/>
+              <a:t>: just make sure you start from a clean state</a:t>
+            </a:r>
+          </a:p>
+          <a:p>
+            <a:r>
+              <a:rPr lang="en-US" b="1" dirty="0"/>
+              <a:t>i</a:t>
+            </a:r>
+            <a:r>
+              <a:rPr lang="en-US" b="1" dirty="0" smtClean="0"/>
+              <a:t>nstall</a:t>
+            </a:r>
+            <a:r>
+              <a:rPr lang="en-US" dirty="0" smtClean="0"/>
+              <a:t>: it executes all previous phases, including </a:t>
+            </a:r>
+            <a:r>
+              <a:rPr lang="en-US" b="1" dirty="0" smtClean="0"/>
+              <a:t>compile</a:t>
+            </a:r>
+            <a:r>
+              <a:rPr lang="en-US" dirty="0" smtClean="0"/>
+              <a:t> and </a:t>
+            </a:r>
+            <a:r>
+              <a:rPr lang="en-US" b="1" dirty="0" smtClean="0"/>
+              <a:t>package</a:t>
+            </a:r>
+          </a:p>
+          <a:p>
+            <a:r>
+              <a:rPr lang="en-US" b="1" dirty="0"/>
+              <a:t>-</a:t>
+            </a:r>
+            <a:r>
+              <a:rPr lang="en-US" b="1" dirty="0" err="1" smtClean="0"/>
+              <a:t>DskipTests</a:t>
+            </a:r>
+            <a:r>
+              <a:rPr lang="en-US" dirty="0" smtClean="0"/>
+              <a:t>: avoid running tests</a:t>
+            </a:r>
+          </a:p>
+          <a:p>
+            <a:r>
+              <a:rPr lang="en-US" dirty="0" smtClean="0"/>
+              <a:t>WARNING: first time, it will take a long while, as many libraries will need to be downloaded</a:t>
+            </a:r>
+          </a:p>
+          <a:p>
+            <a:endParaRPr lang="en-US" dirty="0"/>
           </a:p>
         </p:txBody>
       </p:sp>
     </p:spTree>
     <p:extLst>
       <p:ext uri="{BB962C8B-B14F-4D97-AF65-F5344CB8AC3E}">
-        <p14:creationId xmlns:p14="http://schemas.microsoft.com/office/powerpoint/2010/main" val="126704957"/>
+        <p14:creationId xmlns:p14="http://schemas.microsoft.com/office/powerpoint/2010/main" val="465377794"/>
       </p:ext>
     </p:extLst>
   </p:cSld>
@@ -11157,37 +11246,14 @@
             <p:ph type="title"/>
           </p:nvPr>
         </p:nvSpPr>
-        <p:spPr>
-          <a:xfrm>
-            <a:off x="344031" y="365125"/>
-            <a:ext cx="11497901" cy="1325563"/>
-          </a:xfrm>
-        </p:spPr>
-        <p:txBody>
-          <a:bodyPr>
-            <a:normAutofit fontScale="90000"/>
-          </a:bodyPr>
-          <a:lstStyle/>
-          <a:p>
-            <a:r>
-              <a:rPr lang="en-US" smtClean="0"/>
-              <a:t>Object-Relational </a:t>
-            </a:r>
-            <a:r>
-              <a:rPr lang="en-US" dirty="0" smtClean="0"/>
-              <a:t>M</a:t>
-            </a:r>
-            <a:r>
-              <a:rPr lang="en-US" smtClean="0"/>
-              <a:t>apping</a:t>
-            </a:r>
-            <a:r>
-              <a:rPr lang="en-US"/>
-              <a:t> </a:t>
-            </a:r>
-            <a:r>
-              <a:rPr lang="en-US" smtClean="0"/>
-              <a:t>(ORM)</a:t>
+        <p:spPr/>
+        <p:txBody>
+          <a:bodyPr/>
+          <a:lstStyle/>
+          <a:p>
+            <a:r>
+              <a:rPr lang="en-US" dirty="0" smtClean="0"/>
+              <a:t>JPA: Java Persistence API</a:t>
             </a:r>
             <a:endParaRPr lang="en-US" dirty="0"/>
           </a:p>
@@ -11195,92 +11261,27 @@
       </p:sp>
       <p:sp>
         <p:nvSpPr>
-          <p:cNvPr id="3" name="Content Placeholder 2"/>
-          <p:cNvSpPr>
-            <a:spLocks noGrp="1"/>
-          </p:cNvSpPr>
-          <p:nvPr>
-            <p:ph idx="1"/>
-          </p:nvPr>
-        </p:nvSpPr>
-        <p:spPr>
-          <a:xfrm>
-            <a:off x="838200" y="1825625"/>
-            <a:ext cx="10515600" cy="4702396"/>
-          </a:xfrm>
-        </p:spPr>
-        <p:txBody>
-          <a:bodyPr>
-            <a:normAutofit fontScale="92500"/>
-          </a:bodyPr>
-          <a:lstStyle/>
-          <a:p>
-            <a:r>
-              <a:rPr lang="en-US" dirty="0" smtClean="0"/>
-              <a:t>Mapping data from SQL Databases (DB)</a:t>
-            </a:r>
-          </a:p>
-          <a:p>
-            <a:r>
-              <a:rPr lang="en-US" dirty="0" smtClean="0"/>
-              <a:t>In your programs, using Java classes to represent data from DB</a:t>
-            </a:r>
-          </a:p>
-          <a:p>
-            <a:r>
-              <a:rPr lang="en-US" dirty="0" smtClean="0"/>
-              <a:t>Idea of JPA: define </a:t>
-            </a:r>
-            <a:r>
-              <a:rPr lang="en-US" i="1" dirty="0" smtClean="0"/>
-              <a:t>@Entity</a:t>
-            </a:r>
-            <a:r>
-              <a:rPr lang="en-US" dirty="0" smtClean="0"/>
-              <a:t> classes for each table in the DB, and let the JPA framework do all the work to read/write to/from DB when modify the </a:t>
-            </a:r>
-            <a:r>
-              <a:rPr lang="en-US" i="1" dirty="0" smtClean="0"/>
-              <a:t>@Entity </a:t>
-            </a:r>
-            <a:r>
-              <a:rPr lang="en-US" dirty="0" smtClean="0"/>
-              <a:t>classes</a:t>
-            </a:r>
-          </a:p>
-          <a:p>
-            <a:r>
-              <a:rPr lang="en-US" dirty="0" smtClean="0"/>
-              <a:t>In theory, no need of SQL. But still might want to use in some cases (</a:t>
-            </a:r>
-            <a:r>
-              <a:rPr lang="en-US" dirty="0" err="1" smtClean="0"/>
-              <a:t>eg</a:t>
-            </a:r>
-            <a:r>
-              <a:rPr lang="en-US" dirty="0" smtClean="0"/>
-              <a:t>, for complex queries), or when the JPA implementation gives </a:t>
-            </a:r>
-            <a:r>
-              <a:rPr lang="en-US" i="1" dirty="0" smtClean="0"/>
-              <a:t>weird</a:t>
-            </a:r>
-            <a:r>
-              <a:rPr lang="en-US" dirty="0" smtClean="0"/>
-              <a:t> results</a:t>
-            </a:r>
-            <a:r>
-              <a:rPr lang="mr-IN" dirty="0" smtClean="0"/>
-              <a:t>…</a:t>
-            </a:r>
-            <a:endParaRPr lang="en-US" dirty="0"/>
+          <p:cNvPr id="3" name="Text Placeholder 2"/>
+          <p:cNvSpPr>
+            <a:spLocks noGrp="1"/>
+          </p:cNvSpPr>
+          <p:nvPr>
+            <p:ph type="body" idx="1"/>
+          </p:nvPr>
+        </p:nvSpPr>
+        <p:spPr/>
+        <p:txBody>
+          <a:bodyPr/>
+          <a:lstStyle/>
+          <a:p>
+            <a:endParaRPr lang="en-US"/>
           </a:p>
         </p:txBody>
       </p:sp>
     </p:spTree>
     <p:extLst>
       <p:ext uri="{BB962C8B-B14F-4D97-AF65-F5344CB8AC3E}">
-        <p14:creationId xmlns:p14="http://schemas.microsoft.com/office/powerpoint/2010/main" val="1062118139"/>
+        <p14:creationId xmlns:p14="http://schemas.microsoft.com/office/powerpoint/2010/main" val="126704957"/>
       </p:ext>
     </p:extLst>
   </p:cSld>
@@ -11317,14 +11318,37 @@
             <p:ph type="title"/>
           </p:nvPr>
         </p:nvSpPr>
-        <p:spPr/>
-        <p:txBody>
-          <a:bodyPr/>
-          <a:lstStyle/>
-          <a:p>
-            <a:r>
-              <a:rPr lang="en-US" dirty="0" smtClean="0"/>
-              <a:t>Hibernate</a:t>
+        <p:spPr>
+          <a:xfrm>
+            <a:off x="344031" y="365125"/>
+            <a:ext cx="11497901" cy="1325563"/>
+          </a:xfrm>
+        </p:spPr>
+        <p:txBody>
+          <a:bodyPr>
+            <a:normAutofit fontScale="90000"/>
+          </a:bodyPr>
+          <a:lstStyle/>
+          <a:p>
+            <a:r>
+              <a:rPr lang="en-US" smtClean="0"/>
+              <a:t>Object-Relational </a:t>
+            </a:r>
+            <a:r>
+              <a:rPr lang="en-US" dirty="0" smtClean="0"/>
+              <a:t>M</a:t>
+            </a:r>
+            <a:r>
+              <a:rPr lang="en-US" smtClean="0"/>
+              <a:t>apping</a:t>
+            </a:r>
+            <a:r>
+              <a:rPr lang="en-US"/>
+              <a:t> </a:t>
+            </a:r>
+            <a:r>
+              <a:rPr lang="en-US" smtClean="0"/>
+              <a:t>(ORM)</a:t>
             </a:r>
             <a:endParaRPr lang="en-US" dirty="0"/>
           </a:p>
@@ -11340,98 +11364,84 @@
             <p:ph idx="1"/>
           </p:nvPr>
         </p:nvSpPr>
-        <p:spPr/>
-        <p:txBody>
-          <a:bodyPr/>
-          <a:lstStyle/>
-          <a:p>
-            <a:r>
-              <a:rPr lang="en-US" dirty="0" smtClean="0"/>
-              <a:t>A JPA implementation</a:t>
-            </a:r>
-          </a:p>
-          <a:p>
-            <a:r>
-              <a:rPr lang="en-US" dirty="0" smtClean="0"/>
-              <a:t>Most popular in Java</a:t>
-            </a:r>
-          </a:p>
-          <a:p>
-            <a:pPr lvl="1"/>
-            <a:r>
-              <a:rPr lang="en-US" dirty="0" smtClean="0"/>
-              <a:t>Default in Java EE containers like </a:t>
+        <p:spPr>
+          <a:xfrm>
+            <a:off x="838200" y="1825625"/>
+            <a:ext cx="10515600" cy="4702396"/>
+          </a:xfrm>
+        </p:spPr>
+        <p:txBody>
+          <a:bodyPr>
+            <a:normAutofit fontScale="92500"/>
+          </a:bodyPr>
+          <a:lstStyle/>
+          <a:p>
+            <a:r>
+              <a:rPr lang="en-US" dirty="0" smtClean="0"/>
+              <a:t>Mapping data from SQL Databases (DB)</a:t>
+            </a:r>
+          </a:p>
+          <a:p>
+            <a:r>
+              <a:rPr lang="en-US" dirty="0" smtClean="0"/>
+              <a:t>In your programs, using Java classes to represent data from DB</a:t>
+            </a:r>
+          </a:p>
+          <a:p>
+            <a:r>
+              <a:rPr lang="en-US" dirty="0" smtClean="0"/>
+              <a:t>Idea of JPA: define </a:t>
+            </a:r>
+            <a:r>
+              <a:rPr lang="en-US" i="1" dirty="0" smtClean="0"/>
+              <a:t>@Entity</a:t>
+            </a:r>
+            <a:r>
+              <a:rPr lang="en-US" dirty="0" smtClean="0"/>
+              <a:t> classes for each table in the DB, and let the JPA framework do all the work to read/write to/from DB when modify the </a:t>
+            </a:r>
+            <a:r>
+              <a:rPr lang="en-US" i="1" dirty="0" smtClean="0"/>
+              <a:t>@Entity </a:t>
+            </a:r>
+            <a:r>
+              <a:rPr lang="en-US" dirty="0" smtClean="0"/>
+              <a:t>classes</a:t>
+            </a:r>
+          </a:p>
+          <a:p>
+            <a:r>
+              <a:rPr lang="en-US" dirty="0" smtClean="0"/>
+              <a:t>In theory, no need of SQL. But still might want to use in some cases (</a:t>
             </a:r>
             <a:r>
               <a:rPr lang="en-US" dirty="0" err="1" smtClean="0"/>
-              <a:t>Wildfly</a:t>
-            </a:r>
-            <a:endParaRPr lang="en-US" dirty="0" smtClean="0"/>
-          </a:p>
-          <a:p>
-            <a:pPr lvl="1"/>
-            <a:r>
-              <a:rPr lang="en-US" dirty="0" smtClean="0"/>
-              <a:t>Default in </a:t>
-            </a:r>
-            <a:r>
-              <a:rPr lang="en-US" dirty="0" err="1" smtClean="0"/>
-              <a:t>SpringBoot</a:t>
-            </a:r>
-            <a:endParaRPr lang="en-US" dirty="0" smtClean="0"/>
-          </a:p>
-          <a:p>
-            <a:r>
-              <a:rPr lang="en-US" dirty="0" smtClean="0"/>
-              <a:t>As a library, can be used in any Java program </a:t>
-            </a:r>
-          </a:p>
-          <a:p>
-            <a:pPr lvl="1"/>
-            <a:r>
-              <a:rPr lang="en-US" dirty="0" err="1"/>
-              <a:t>i</a:t>
-            </a:r>
-            <a:r>
-              <a:rPr lang="en-US" dirty="0" err="1" smtClean="0"/>
-              <a:t>e</a:t>
-            </a:r>
-            <a:r>
-              <a:rPr lang="en-US" dirty="0" smtClean="0"/>
-              <a:t>, not necessarily in EE or Spring</a:t>
-            </a:r>
-          </a:p>
-          <a:p>
-            <a:r>
-              <a:rPr lang="en-US" b="1" dirty="0" err="1" smtClean="0"/>
-              <a:t>src</a:t>
-            </a:r>
-            <a:r>
-              <a:rPr lang="en-US" b="1" dirty="0" smtClean="0"/>
-              <a:t>/main/resources/META-INF/</a:t>
-            </a:r>
-            <a:r>
-              <a:rPr lang="en-US" b="1" dirty="0" err="1" smtClean="0"/>
-              <a:t>persistence.xml</a:t>
-            </a:r>
-            <a:endParaRPr lang="en-US" b="1" dirty="0" smtClean="0"/>
-          </a:p>
-          <a:p>
-            <a:pPr lvl="1"/>
-            <a:r>
-              <a:rPr lang="en-US" dirty="0" smtClean="0"/>
-              <a:t>Configuration file for JPA </a:t>
-            </a:r>
-          </a:p>
-          <a:p>
-            <a:endParaRPr lang="en-US" dirty="0" smtClean="0"/>
+              <a:t>eg</a:t>
+            </a:r>
+            <a:r>
+              <a:rPr lang="en-US" dirty="0" smtClean="0"/>
+              <a:t>, for complex queries), or when the JPA implementation gives </a:t>
+            </a:r>
+            <a:r>
+              <a:rPr lang="en-US" i="1" dirty="0" smtClean="0"/>
+              <a:t>weird</a:t>
+            </a:r>
+            <a:r>
+              <a:rPr lang="en-US" dirty="0" smtClean="0"/>
+              <a:t> results</a:t>
+            </a:r>
+            <a:r>
+              <a:rPr lang="mr-IN" dirty="0" smtClean="0"/>
+              <a:t>…</a:t>
+            </a:r>
+            <a:endParaRPr lang="en-US" dirty="0"/>
           </a:p>
         </p:txBody>
       </p:sp>
     </p:spTree>
     <p:extLst>
       <p:ext uri="{BB962C8B-B14F-4D97-AF65-F5344CB8AC3E}">
-        <p14:creationId xmlns:p14="http://schemas.microsoft.com/office/powerpoint/2010/main" val="851986526"/>
+        <p14:creationId xmlns:p14="http://schemas.microsoft.com/office/powerpoint/2010/main" val="1062118139"/>
       </p:ext>
     </p:extLst>
   </p:cSld>
@@ -11475,7 +11485,7 @@
           <a:p>
             <a:r>
               <a:rPr lang="en-US" dirty="0" smtClean="0"/>
-              <a:t>Database Schema</a:t>
+              <a:t>Hibernate</a:t>
             </a:r>
             <a:endParaRPr lang="en-US" dirty="0"/>
           </a:p>
@@ -11498,56 +11508,91 @@
           <a:p>
             <a:r>
               <a:rPr lang="en-US" dirty="0" smtClean="0"/>
-              <a:t>Given an existing DB, need to write </a:t>
-            </a:r>
-            <a:r>
-              <a:rPr lang="en-US" i="1" dirty="0" smtClean="0"/>
-              <a:t>@Entity</a:t>
-            </a:r>
-            <a:r>
-              <a:rPr lang="en-US" dirty="0" smtClean="0"/>
-              <a:t> classes for each table</a:t>
-            </a:r>
-          </a:p>
-          <a:p>
-            <a:r>
-              <a:rPr lang="en-US" dirty="0" smtClean="0"/>
-              <a:t>Other option: write the </a:t>
-            </a:r>
-            <a:r>
-              <a:rPr lang="en-US" i="1" dirty="0"/>
-              <a:t>@Entity</a:t>
-            </a:r>
-            <a:r>
-              <a:rPr lang="en-US" dirty="0"/>
-              <a:t> </a:t>
-            </a:r>
-            <a:r>
-              <a:rPr lang="en-US" dirty="0" smtClean="0"/>
-              <a:t>classes first, and generate the schemas automatically afterwards</a:t>
+              <a:t>A JPA implementation</a:t>
+            </a:r>
+          </a:p>
+          <a:p>
+            <a:r>
+              <a:rPr lang="en-US" dirty="0" smtClean="0"/>
+              <a:t>Most popular in Java</a:t>
             </a:r>
           </a:p>
           <a:p>
             <a:pPr lvl="1"/>
             <a:r>
               <a:rPr lang="en-US" dirty="0" smtClean="0"/>
-              <a:t>Easier when you are more familiar with Java than SQL</a:t>
-            </a:r>
+              <a:t>Default in Java EE containers like </a:t>
+            </a:r>
+            <a:r>
+              <a:rPr lang="en-US" dirty="0" err="1" smtClean="0"/>
+              <a:t>Wildfly</a:t>
+            </a:r>
+            <a:endParaRPr lang="en-US" dirty="0" smtClean="0"/>
           </a:p>
           <a:p>
             <a:pPr lvl="1"/>
             <a:r>
               <a:rPr lang="en-US" dirty="0" smtClean="0"/>
-              <a:t>Good for prototyping </a:t>
-            </a:r>
-            <a:endParaRPr lang="en-US" dirty="0"/>
+              <a:t>Default in </a:t>
+            </a:r>
+            <a:r>
+              <a:rPr lang="en-US" dirty="0" err="1" smtClean="0"/>
+              <a:t>SpringBoot</a:t>
+            </a:r>
+            <a:endParaRPr lang="en-US" dirty="0" smtClean="0"/>
+          </a:p>
+          <a:p>
+            <a:r>
+              <a:rPr lang="en-US" dirty="0" smtClean="0"/>
+              <a:t>As a library, can be used in any Java program </a:t>
+            </a:r>
+          </a:p>
+          <a:p>
+            <a:pPr lvl="1"/>
+            <a:r>
+              <a:rPr lang="en-US" dirty="0" err="1"/>
+              <a:t>i</a:t>
+            </a:r>
+            <a:r>
+              <a:rPr lang="en-US" dirty="0" err="1" smtClean="0"/>
+              <a:t>e</a:t>
+            </a:r>
+            <a:r>
+              <a:rPr lang="en-US" dirty="0" smtClean="0"/>
+              <a:t>, not necessarily in EE or Spring</a:t>
+            </a:r>
+          </a:p>
+          <a:p>
+            <a:r>
+              <a:rPr lang="en-US" b="1" dirty="0" err="1" smtClean="0"/>
+              <a:t>src</a:t>
+            </a:r>
+            <a:r>
+              <a:rPr lang="en-US" b="1" dirty="0" smtClean="0"/>
+              <a:t>/main/resources/META-INF/</a:t>
+            </a:r>
+            <a:r>
+              <a:rPr lang="en-US" b="1" dirty="0" err="1" smtClean="0"/>
+              <a:t>persistence.xml</a:t>
+            </a:r>
+            <a:endParaRPr lang="en-US" b="1" dirty="0" smtClean="0"/>
+          </a:p>
+          <a:p>
+            <a:pPr lvl="1"/>
+            <a:r>
+              <a:rPr lang="en-US" dirty="0" smtClean="0"/>
+              <a:t>Configuration file for JPA </a:t>
+            </a:r>
+          </a:p>
+          <a:p>
+            <a:endParaRPr lang="en-US" dirty="0" smtClean="0"/>
           </a:p>
         </p:txBody>
       </p:sp>
     </p:spTree>
     <p:extLst>
       <p:ext uri="{BB962C8B-B14F-4D97-AF65-F5344CB8AC3E}">
-        <p14:creationId xmlns:p14="http://schemas.microsoft.com/office/powerpoint/2010/main" val="1360850773"/>
+        <p14:creationId xmlns:p14="http://schemas.microsoft.com/office/powerpoint/2010/main" val="851986526"/>
       </p:ext>
     </p:extLst>
   </p:cSld>
@@ -11576,6 +11621,122 @@
       </p:grpSpPr>
       <p:sp>
         <p:nvSpPr>
+          <p:cNvPr id="2" name="Title 1"/>
+          <p:cNvSpPr>
+            <a:spLocks noGrp="1"/>
+          </p:cNvSpPr>
+          <p:nvPr>
+            <p:ph type="title"/>
+          </p:nvPr>
+        </p:nvSpPr>
+        <p:spPr/>
+        <p:txBody>
+          <a:bodyPr/>
+          <a:lstStyle/>
+          <a:p>
+            <a:r>
+              <a:rPr lang="en-US" dirty="0" smtClean="0"/>
+              <a:t>Database Schema</a:t>
+            </a:r>
+            <a:endParaRPr lang="en-US" dirty="0"/>
+          </a:p>
+        </p:txBody>
+      </p:sp>
+      <p:sp>
+        <p:nvSpPr>
+          <p:cNvPr id="3" name="Content Placeholder 2"/>
+          <p:cNvSpPr>
+            <a:spLocks noGrp="1"/>
+          </p:cNvSpPr>
+          <p:nvPr>
+            <p:ph idx="1"/>
+          </p:nvPr>
+        </p:nvSpPr>
+        <p:spPr/>
+        <p:txBody>
+          <a:bodyPr/>
+          <a:lstStyle/>
+          <a:p>
+            <a:r>
+              <a:rPr lang="en-US" dirty="0" smtClean="0"/>
+              <a:t>Given an existing DB, need to write </a:t>
+            </a:r>
+            <a:r>
+              <a:rPr lang="en-US" i="1" dirty="0" smtClean="0"/>
+              <a:t>@Entity</a:t>
+            </a:r>
+            <a:r>
+              <a:rPr lang="en-US" dirty="0" smtClean="0"/>
+              <a:t> classes for each table</a:t>
+            </a:r>
+          </a:p>
+          <a:p>
+            <a:r>
+              <a:rPr lang="en-US" dirty="0" smtClean="0"/>
+              <a:t>Other option: write the </a:t>
+            </a:r>
+            <a:r>
+              <a:rPr lang="en-US" i="1" dirty="0"/>
+              <a:t>@Entity</a:t>
+            </a:r>
+            <a:r>
+              <a:rPr lang="en-US" dirty="0"/>
+              <a:t> </a:t>
+            </a:r>
+            <a:r>
+              <a:rPr lang="en-US" dirty="0" smtClean="0"/>
+              <a:t>classes first, and generate the schemas automatically afterwards</a:t>
+            </a:r>
+          </a:p>
+          <a:p>
+            <a:pPr lvl="1"/>
+            <a:r>
+              <a:rPr lang="en-US" dirty="0" smtClean="0"/>
+              <a:t>Easier when you are more familiar with Java than SQL</a:t>
+            </a:r>
+          </a:p>
+          <a:p>
+            <a:pPr lvl="1"/>
+            <a:r>
+              <a:rPr lang="en-US" dirty="0" smtClean="0"/>
+              <a:t>Good for prototyping </a:t>
+            </a:r>
+            <a:endParaRPr lang="en-US" dirty="0"/>
+          </a:p>
+        </p:txBody>
+      </p:sp>
+    </p:spTree>
+    <p:extLst>
+      <p:ext uri="{BB962C8B-B14F-4D97-AF65-F5344CB8AC3E}">
+        <p14:creationId xmlns:p14="http://schemas.microsoft.com/office/powerpoint/2010/main" val="1360850773"/>
+      </p:ext>
+    </p:extLst>
+  </p:cSld>
+  <p:clrMapOvr>
+    <a:masterClrMapping/>
+  </p:clrMapOvr>
+</p:sld>
+</file>
+
+<file path=ppt/slides/slide47.xml><?xml version="1.0" encoding="utf-8"?>
+<p:sld xmlns:a="http://schemas.openxmlformats.org/drawingml/2006/main" xmlns:r="http://schemas.openxmlformats.org/officeDocument/2006/relationships" xmlns:p="http://schemas.openxmlformats.org/presentationml/2006/main">
+  <p:cSld>
+    <p:spTree>
+      <p:nvGrpSpPr>
+        <p:cNvPr id="1" name=""/>
+        <p:cNvGrpSpPr/>
+        <p:nvPr/>
+      </p:nvGrpSpPr>
+      <p:grpSpPr>
+        <a:xfrm>
+          <a:off x="0" y="0"/>
+          <a:ext cx="0" cy="0"/>
+          <a:chOff x="0" y="0"/>
+          <a:chExt cx="0" cy="0"/>
+        </a:xfrm>
+      </p:grpSpPr>
+      <p:sp>
+        <p:nvSpPr>
           <p:cNvPr id="4" name="Title 3"/>
           <p:cNvSpPr>
             <a:spLocks noGrp="1"/>
@@ -11816,11 +11977,7 @@
             </a:r>
             <a:r>
               <a:rPr lang="en-US" dirty="0" smtClean="0"/>
-              <a:t>Transient, etc</a:t>
-            </a:r>
-            <a:r>
-              <a:rPr lang="en-US" dirty="0" smtClean="0"/>
-              <a:t>.</a:t>
+              <a:t>Transient, etc.</a:t>
             </a:r>
           </a:p>
           <a:p>

</xml_diff>